<commit_message>
update bao cao ngay 03-12-2010 (finish)
</commit_message>
<xml_diff>
--- a/De Cuong/bao cao 03-12-2010.pptx
+++ b/De Cuong/bao cao 03-12-2010.pptx
@@ -5,7 +5,7 @@
     <p:sldMasterId id="2147483648" r:id="rId1"/>
   </p:sldMasterIdLst>
   <p:notesMasterIdLst>
-    <p:notesMasterId r:id="rId17"/>
+    <p:notesMasterId r:id="rId20"/>
   </p:notesMasterIdLst>
   <p:sldIdLst>
     <p:sldId id="258" r:id="rId2"/>
@@ -14,15 +14,18 @@
     <p:sldId id="279" r:id="rId5"/>
     <p:sldId id="280" r:id="rId6"/>
     <p:sldId id="288" r:id="rId7"/>
-    <p:sldId id="281" r:id="rId8"/>
-    <p:sldId id="282" r:id="rId9"/>
-    <p:sldId id="283" r:id="rId10"/>
-    <p:sldId id="285" r:id="rId11"/>
-    <p:sldId id="286" r:id="rId12"/>
-    <p:sldId id="287" r:id="rId13"/>
-    <p:sldId id="278" r:id="rId14"/>
-    <p:sldId id="284" r:id="rId15"/>
-    <p:sldId id="267" r:id="rId16"/>
+    <p:sldId id="295" r:id="rId8"/>
+    <p:sldId id="281" r:id="rId9"/>
+    <p:sldId id="289" r:id="rId10"/>
+    <p:sldId id="290" r:id="rId11"/>
+    <p:sldId id="291" r:id="rId12"/>
+    <p:sldId id="292" r:id="rId13"/>
+    <p:sldId id="293" r:id="rId14"/>
+    <p:sldId id="294" r:id="rId15"/>
+    <p:sldId id="287" r:id="rId16"/>
+    <p:sldId id="278" r:id="rId17"/>
+    <p:sldId id="284" r:id="rId18"/>
+    <p:sldId id="267" r:id="rId19"/>
   </p:sldIdLst>
   <p:sldSz cx="9144000" cy="6858000" type="screen4x3"/>
   <p:notesSz cx="6858000" cy="9144000"/>
@@ -237,7 +240,7 @@
             <a:fld id="{3B14A4C4-CD5F-4363-9455-E1F0DAF53B53}" type="datetimeFigureOut">
               <a:rPr lang="en-US" smtClean="0"/>
               <a:pPr/>
-              <a:t>12/2/2010</a:t>
+              <a:t>12/3/2010</a:t>
             </a:fld>
             <a:endParaRPr lang="en-US"/>
           </a:p>
@@ -5089,91 +5092,65 @@
           <a:lstStyle/>
           <a:p>
             <a:r>
-              <a:rPr lang="en-US" dirty="0" err="1" smtClean="0"/>
-              <a:t>Xây</a:t>
-            </a:r>
-            <a:r>
-              <a:rPr lang="en-US" dirty="0" smtClean="0"/>
-              <a:t> </a:t>
-            </a:r>
-            <a:r>
-              <a:rPr lang="en-US" dirty="0" err="1" smtClean="0"/>
-              <a:t>dựng</a:t>
-            </a:r>
-            <a:r>
-              <a:rPr lang="en-US" dirty="0" smtClean="0"/>
-              <a:t> </a:t>
-            </a:r>
-            <a:r>
-              <a:rPr lang="en-US" dirty="0" err="1" smtClean="0"/>
-              <a:t>hệ</a:t>
-            </a:r>
-            <a:r>
-              <a:rPr lang="en-US" dirty="0" smtClean="0"/>
-              <a:t> </a:t>
-            </a:r>
-            <a:r>
-              <a:rPr lang="en-US" dirty="0" err="1" smtClean="0"/>
-              <a:t>thống</a:t>
-            </a:r>
-            <a:r>
-              <a:rPr lang="en-US" dirty="0" smtClean="0"/>
-              <a:t> </a:t>
-            </a:r>
-            <a:r>
-              <a:rPr lang="en-US" dirty="0" err="1" smtClean="0"/>
-              <a:t>tra</a:t>
-            </a:r>
-            <a:r>
-              <a:rPr lang="en-US" dirty="0" smtClean="0"/>
-              <a:t> </a:t>
-            </a:r>
-            <a:r>
-              <a:rPr lang="en-US" dirty="0" err="1" smtClean="0"/>
-              <a:t>cứu</a:t>
-            </a:r>
-            <a:r>
-              <a:rPr lang="en-US" dirty="0" smtClean="0"/>
-              <a:t> </a:t>
-            </a:r>
-            <a:r>
-              <a:rPr lang="en-US" dirty="0" err="1" smtClean="0"/>
-              <a:t>bài</a:t>
-            </a:r>
-            <a:r>
-              <a:rPr lang="en-US" dirty="0" smtClean="0"/>
-              <a:t> </a:t>
-            </a:r>
-            <a:r>
-              <a:rPr lang="en-US" dirty="0" err="1" smtClean="0"/>
-              <a:t>báo</a:t>
-            </a:r>
-            <a:r>
-              <a:rPr lang="en-US" dirty="0" smtClean="0"/>
-              <a:t> </a:t>
+              <a:rPr lang="en-US" dirty="0" smtClean="0"/>
+              <a:t>Các bước đề xuất xử lý câu hỏi tự nhiên</a:t>
             </a:r>
             <a:endParaRPr lang="en-US" dirty="0"/>
           </a:p>
         </p:txBody>
       </p:sp>
+      <p:pic>
+        <p:nvPicPr>
+          <p:cNvPr id="5122" name="Picture 2" descr="C:\Users\hoang\Desktop\filnalproject\De Cuong\cac buoc\process steps.jpg"/>
+          <p:cNvPicPr>
+            <a:picLocks noChangeAspect="1" noChangeArrowheads="1"/>
+          </p:cNvPicPr>
+          <p:nvPr/>
+        </p:nvPicPr>
+        <p:blipFill>
+          <a:blip r:embed="rId2"/>
+          <a:srcRect/>
+          <a:stretch>
+            <a:fillRect/>
+          </a:stretch>
+        </p:blipFill>
+        <p:spPr bwMode="auto">
+          <a:xfrm>
+            <a:off x="1600200" y="914400"/>
+            <a:ext cx="5638800" cy="5257800"/>
+          </a:xfrm>
+          <a:prstGeom prst="rect">
+            <a:avLst/>
+          </a:prstGeom>
+          <a:noFill/>
+        </p:spPr>
+      </p:pic>
       <p:sp>
         <p:nvSpPr>
-          <p:cNvPr id="3" name="Content Placeholder 2"/>
-          <p:cNvSpPr>
-            <a:spLocks noGrp="1"/>
-          </p:cNvSpPr>
-          <p:nvPr>
-            <p:ph idx="1"/>
-          </p:nvPr>
+          <p:cNvPr id="6" name="TextBox 5"/>
+          <p:cNvSpPr txBox="1"/>
+          <p:nvPr/>
         </p:nvSpPr>
-        <p:spPr/>
+        <p:spPr>
+          <a:xfrm>
+            <a:off x="1371600" y="6172200"/>
+            <a:ext cx="6096000" cy="381000"/>
+          </a:xfrm>
+          <a:prstGeom prst="rect">
+            <a:avLst/>
+          </a:prstGeom>
+          <a:noFill/>
+        </p:spPr>
         <p:txBody>
-          <a:bodyPr/>
+          <a:bodyPr wrap="square" rtlCol="0">
+            <a:spAutoFit/>
+          </a:bodyPr>
           <a:lstStyle/>
           <a:p>
-            <a:r>
-              <a:rPr lang="en-US" dirty="0" smtClean="0"/>
-              <a:t>(image)</a:t>
+            <a:pPr algn="ctr"/>
+            <a:r>
+              <a:rPr lang="en-US" dirty="0" smtClean="0"/>
+              <a:t>Hình 4 – đề xuất 4 bước xử lý câu hỏi</a:t>
             </a:r>
             <a:endParaRPr lang="en-US" dirty="0"/>
           </a:p>
@@ -5220,92 +5197,8 @@
           <a:lstStyle/>
           <a:p>
             <a:r>
-              <a:rPr lang="en-US" dirty="0" err="1" smtClean="0"/>
-              <a:t>Các</a:t>
-            </a:r>
-            <a:r>
-              <a:rPr lang="en-US" dirty="0" smtClean="0"/>
-              <a:t> </a:t>
-            </a:r>
-            <a:r>
-              <a:rPr lang="en-US" dirty="0" err="1" smtClean="0"/>
-              <a:t>bước</a:t>
-            </a:r>
-            <a:r>
-              <a:rPr lang="en-US" dirty="0" smtClean="0"/>
-              <a:t> </a:t>
-            </a:r>
-            <a:r>
-              <a:rPr lang="en-US" dirty="0" err="1" smtClean="0"/>
-              <a:t>đề</a:t>
-            </a:r>
-            <a:r>
-              <a:rPr lang="en-US" dirty="0" smtClean="0"/>
-              <a:t> </a:t>
-            </a:r>
-            <a:r>
-              <a:rPr lang="en-US" dirty="0" err="1" smtClean="0"/>
-              <a:t>xuất</a:t>
-            </a:r>
-            <a:r>
-              <a:rPr lang="en-US" dirty="0" smtClean="0"/>
-              <a:t> </a:t>
-            </a:r>
-            <a:r>
-              <a:rPr lang="en-US" dirty="0" err="1" smtClean="0"/>
-              <a:t>để</a:t>
-            </a:r>
-            <a:r>
-              <a:rPr lang="en-US" dirty="0" smtClean="0"/>
-              <a:t> </a:t>
-            </a:r>
-            <a:r>
-              <a:rPr lang="en-US" dirty="0" err="1" smtClean="0"/>
-              <a:t>xử</a:t>
-            </a:r>
-            <a:r>
-              <a:rPr lang="en-US" dirty="0" smtClean="0"/>
-              <a:t> </a:t>
-            </a:r>
-            <a:r>
-              <a:rPr lang="en-US" dirty="0" err="1" smtClean="0"/>
-              <a:t>lý</a:t>
-            </a:r>
-            <a:r>
-              <a:rPr lang="en-US" dirty="0" smtClean="0"/>
-              <a:t> </a:t>
-            </a:r>
-            <a:r>
-              <a:rPr lang="en-US" dirty="0" err="1" smtClean="0"/>
-              <a:t>câu</a:t>
-            </a:r>
-            <a:r>
-              <a:rPr lang="en-US" dirty="0" smtClean="0"/>
-              <a:t> </a:t>
-            </a:r>
-            <a:r>
-              <a:rPr lang="en-US" dirty="0" err="1" smtClean="0"/>
-              <a:t>hỏi</a:t>
-            </a:r>
-            <a:r>
-              <a:rPr lang="en-US" dirty="0" smtClean="0"/>
-              <a:t> </a:t>
-            </a:r>
-            <a:r>
-              <a:rPr lang="en-US" dirty="0" err="1" smtClean="0"/>
-              <a:t>tự</a:t>
-            </a:r>
-            <a:r>
-              <a:rPr lang="en-US" dirty="0" smtClean="0"/>
-              <a:t> </a:t>
-            </a:r>
-            <a:r>
-              <a:rPr lang="en-US" dirty="0" err="1" smtClean="0"/>
-              <a:t>nhiên</a:t>
-            </a:r>
-            <a:r>
-              <a:rPr lang="en-US" dirty="0" smtClean="0"/>
-              <a:t> </a:t>
+              <a:rPr lang="en-US" dirty="0" smtClean="0"/>
+              <a:t>Các bước đề xuất xử lý câu hỏi tự nhiên</a:t>
             </a:r>
             <a:endParaRPr lang="en-US" dirty="0"/>
           </a:p>
@@ -5328,8 +5221,161 @@
           <a:p>
             <a:r>
               <a:rPr lang="en-US" dirty="0" smtClean="0"/>
-              <a:t>(image)</a:t>
-            </a:r>
+              <a:t>Tạo tập tin xml cấu hình ngữ nghĩa cho cơ sở dữ </a:t>
+            </a:r>
+            <a:r>
+              <a:rPr lang="en-US" dirty="0" err="1" smtClean="0"/>
+              <a:t>liệu</a:t>
+            </a:r>
+            <a:r>
+              <a:rPr lang="en-US" dirty="0" smtClean="0"/>
+              <a:t>. Do </a:t>
+            </a:r>
+            <a:r>
+              <a:rPr lang="en-US" dirty="0" err="1" smtClean="0"/>
+              <a:t>cơ</a:t>
+            </a:r>
+            <a:r>
+              <a:rPr lang="en-US" dirty="0" smtClean="0"/>
+              <a:t> </a:t>
+            </a:r>
+            <a:r>
+              <a:rPr lang="en-US" dirty="0" err="1" smtClean="0"/>
+              <a:t>sở</a:t>
+            </a:r>
+            <a:r>
+              <a:rPr lang="en-US" dirty="0" smtClean="0"/>
+              <a:t> </a:t>
+            </a:r>
+            <a:r>
+              <a:rPr lang="en-US" dirty="0" err="1" smtClean="0"/>
+              <a:t>dữ</a:t>
+            </a:r>
+            <a:r>
+              <a:rPr lang="en-US" dirty="0" smtClean="0"/>
+              <a:t> </a:t>
+            </a:r>
+            <a:r>
+              <a:rPr lang="en-US" dirty="0" err="1" smtClean="0"/>
+              <a:t>liệu</a:t>
+            </a:r>
+            <a:r>
+              <a:rPr lang="en-US" dirty="0" smtClean="0"/>
+              <a:t> </a:t>
+            </a:r>
+            <a:r>
+              <a:rPr lang="en-US" dirty="0" err="1" smtClean="0"/>
+              <a:t>không</a:t>
+            </a:r>
+            <a:r>
+              <a:rPr lang="en-US" dirty="0" smtClean="0"/>
+              <a:t> </a:t>
+            </a:r>
+            <a:r>
+              <a:rPr lang="en-US" dirty="0" err="1" smtClean="0"/>
+              <a:t>thể</a:t>
+            </a:r>
+            <a:r>
+              <a:rPr lang="en-US" dirty="0" smtClean="0"/>
+              <a:t> </a:t>
+            </a:r>
+            <a:r>
+              <a:rPr lang="en-US" dirty="0" err="1" smtClean="0"/>
+              <a:t>hiện</a:t>
+            </a:r>
+            <a:r>
+              <a:rPr lang="en-US" dirty="0" smtClean="0"/>
+              <a:t> </a:t>
+            </a:r>
+            <a:r>
+              <a:rPr lang="en-US" dirty="0" err="1" smtClean="0"/>
+              <a:t>được</a:t>
+            </a:r>
+            <a:r>
+              <a:rPr lang="en-US" dirty="0" smtClean="0"/>
+              <a:t> </a:t>
+            </a:r>
+            <a:r>
+              <a:rPr lang="en-US" dirty="0" err="1" smtClean="0"/>
+              <a:t>mối</a:t>
+            </a:r>
+            <a:r>
+              <a:rPr lang="en-US" dirty="0" smtClean="0"/>
+              <a:t> </a:t>
+            </a:r>
+            <a:r>
+              <a:rPr lang="en-US" dirty="0" err="1" smtClean="0"/>
+              <a:t>quan</a:t>
+            </a:r>
+            <a:r>
+              <a:rPr lang="en-US" dirty="0" smtClean="0"/>
+              <a:t> </a:t>
+            </a:r>
+            <a:r>
+              <a:rPr lang="en-US" dirty="0" err="1" smtClean="0"/>
+              <a:t>hệ</a:t>
+            </a:r>
+            <a:r>
+              <a:rPr lang="en-US" dirty="0" smtClean="0"/>
+              <a:t> </a:t>
+            </a:r>
+            <a:r>
+              <a:rPr lang="en-US" dirty="0" err="1" smtClean="0"/>
+              <a:t>ngữ</a:t>
+            </a:r>
+            <a:r>
+              <a:rPr lang="en-US" dirty="0" smtClean="0"/>
+              <a:t> </a:t>
+            </a:r>
+            <a:r>
+              <a:rPr lang="en-US" dirty="0" err="1" smtClean="0"/>
+              <a:t>nghĩa</a:t>
+            </a:r>
+            <a:r>
+              <a:rPr lang="en-US" dirty="0" smtClean="0"/>
+              <a:t>. </a:t>
+            </a:r>
+          </a:p>
+          <a:p>
+            <a:r>
+              <a:rPr lang="en-US" dirty="0" err="1" smtClean="0"/>
+              <a:t>Tập</a:t>
+            </a:r>
+            <a:r>
+              <a:rPr lang="en-US" dirty="0" smtClean="0"/>
+              <a:t> tin </a:t>
+            </a:r>
+            <a:r>
+              <a:rPr lang="en-US" dirty="0" err="1" smtClean="0"/>
+              <a:t>sẽ</a:t>
+            </a:r>
+            <a:r>
+              <a:rPr lang="en-US" dirty="0" smtClean="0"/>
+              <a:t> </a:t>
+            </a:r>
+            <a:r>
+              <a:rPr lang="en-US" dirty="0" err="1" smtClean="0"/>
+              <a:t>lưu</a:t>
+            </a:r>
+            <a:r>
+              <a:rPr lang="en-US" dirty="0" smtClean="0"/>
+              <a:t> </a:t>
+            </a:r>
+            <a:r>
+              <a:rPr lang="en-US" dirty="0" smtClean="0"/>
+              <a:t>trữ các từ, ngữ quan </a:t>
+            </a:r>
+            <a:r>
+              <a:rPr lang="en-US" dirty="0" err="1" smtClean="0"/>
+              <a:t>hệ</a:t>
+            </a:r>
+            <a:r>
+              <a:rPr lang="en-US" dirty="0" smtClean="0"/>
+              <a:t>.</a:t>
+            </a:r>
+            <a:endParaRPr lang="en-US" dirty="0" smtClean="0"/>
+          </a:p>
+          <a:p>
             <a:endParaRPr lang="en-US" dirty="0"/>
           </a:p>
         </p:txBody>
@@ -5375,40 +5421,8 @@
           <a:lstStyle/>
           <a:p>
             <a:r>
-              <a:rPr lang="en-US" dirty="0" err="1" smtClean="0"/>
-              <a:t>Các</a:t>
-            </a:r>
-            <a:r>
-              <a:rPr lang="en-US" dirty="0" smtClean="0"/>
-              <a:t> </a:t>
-            </a:r>
-            <a:r>
-              <a:rPr lang="en-US" dirty="0" err="1" smtClean="0"/>
-              <a:t>công</a:t>
-            </a:r>
-            <a:r>
-              <a:rPr lang="en-US" dirty="0" smtClean="0"/>
-              <a:t> </a:t>
-            </a:r>
-            <a:r>
-              <a:rPr lang="en-US" dirty="0" err="1" smtClean="0"/>
-              <a:t>việc</a:t>
-            </a:r>
-            <a:r>
-              <a:rPr lang="en-US" dirty="0" smtClean="0"/>
-              <a:t> </a:t>
-            </a:r>
-            <a:r>
-              <a:rPr lang="en-US" dirty="0" err="1" smtClean="0"/>
-              <a:t>sắp</a:t>
-            </a:r>
-            <a:r>
-              <a:rPr lang="en-US" dirty="0" smtClean="0"/>
-              <a:t> </a:t>
-            </a:r>
-            <a:r>
-              <a:rPr lang="en-US" dirty="0" err="1" smtClean="0"/>
-              <a:t>tới</a:t>
+              <a:rPr lang="en-US" dirty="0" smtClean="0"/>
+              <a:t>Các bước đề xuất xử lý câu hỏi tự nhiên</a:t>
             </a:r>
             <a:endParaRPr lang="en-US" dirty="0"/>
           </a:p>
@@ -5429,349 +5443,43 @@
           <a:bodyPr/>
           <a:lstStyle/>
           <a:p>
-            <a:r>
-              <a:rPr lang="en-US" dirty="0" err="1" smtClean="0"/>
-              <a:t>Hiện</a:t>
-            </a:r>
-            <a:r>
-              <a:rPr lang="en-US" dirty="0" smtClean="0"/>
-              <a:t> </a:t>
-            </a:r>
-            <a:r>
-              <a:rPr lang="en-US" dirty="0" err="1" smtClean="0"/>
-              <a:t>thực</a:t>
-            </a:r>
-            <a:r>
-              <a:rPr lang="en-US" dirty="0" smtClean="0"/>
-              <a:t> </a:t>
-            </a:r>
-            <a:r>
-              <a:rPr lang="en-US" dirty="0" err="1" smtClean="0"/>
-              <a:t>các</a:t>
-            </a:r>
-            <a:r>
-              <a:rPr lang="en-US" dirty="0" smtClean="0"/>
-              <a:t> </a:t>
-            </a:r>
-            <a:r>
-              <a:rPr lang="en-US" dirty="0" err="1" smtClean="0"/>
-              <a:t>bước</a:t>
-            </a:r>
-            <a:r>
-              <a:rPr lang="en-US" dirty="0" smtClean="0"/>
-              <a:t> </a:t>
-            </a:r>
-            <a:r>
-              <a:rPr lang="en-US" dirty="0" err="1" smtClean="0"/>
-              <a:t>xử</a:t>
-            </a:r>
-            <a:r>
-              <a:rPr lang="en-US" dirty="0" smtClean="0"/>
-              <a:t> </a:t>
-            </a:r>
-            <a:r>
-              <a:rPr lang="en-US" dirty="0" err="1" smtClean="0"/>
-              <a:t>lý</a:t>
-            </a:r>
-            <a:r>
-              <a:rPr lang="en-US" dirty="0" smtClean="0"/>
-              <a:t> </a:t>
-            </a:r>
-            <a:r>
-              <a:rPr lang="en-US" dirty="0" err="1" smtClean="0"/>
-              <a:t>theo</a:t>
-            </a:r>
-            <a:r>
-              <a:rPr lang="en-US" dirty="0" smtClean="0"/>
-              <a:t> </a:t>
-            </a:r>
-            <a:r>
-              <a:rPr lang="en-US" dirty="0" err="1" smtClean="0"/>
-              <a:t>đề</a:t>
-            </a:r>
-            <a:r>
-              <a:rPr lang="en-US" dirty="0" smtClean="0"/>
-              <a:t> </a:t>
-            </a:r>
-            <a:r>
-              <a:rPr lang="en-US" dirty="0" err="1" smtClean="0"/>
-              <a:t>xuất</a:t>
-            </a:r>
-            <a:r>
-              <a:rPr lang="en-US" dirty="0" smtClean="0"/>
-              <a:t> </a:t>
-            </a:r>
-            <a:r>
-              <a:rPr lang="en-US" dirty="0" err="1" smtClean="0"/>
-              <a:t>để</a:t>
-            </a:r>
-            <a:r>
-              <a:rPr lang="en-US" dirty="0" smtClean="0"/>
-              <a:t> </a:t>
-            </a:r>
-            <a:r>
-              <a:rPr lang="en-US" dirty="0" err="1" smtClean="0"/>
-              <a:t>xử</a:t>
-            </a:r>
-            <a:r>
-              <a:rPr lang="en-US" dirty="0" smtClean="0"/>
-              <a:t> </a:t>
-            </a:r>
-            <a:r>
-              <a:rPr lang="en-US" dirty="0" err="1" smtClean="0"/>
-              <a:t>lý</a:t>
-            </a:r>
-            <a:r>
-              <a:rPr lang="en-US" dirty="0" smtClean="0"/>
-              <a:t> </a:t>
-            </a:r>
-            <a:r>
-              <a:rPr lang="en-US" dirty="0" err="1" smtClean="0"/>
-              <a:t>câu</a:t>
-            </a:r>
-            <a:r>
-              <a:rPr lang="en-US" dirty="0" smtClean="0"/>
-              <a:t> </a:t>
-            </a:r>
-            <a:r>
-              <a:rPr lang="en-US" dirty="0" err="1" smtClean="0"/>
-              <a:t>hỏi</a:t>
-            </a:r>
-            <a:r>
-              <a:rPr lang="en-US" dirty="0" smtClean="0"/>
-              <a:t> </a:t>
-            </a:r>
-            <a:r>
-              <a:rPr lang="en-US" dirty="0" err="1" smtClean="0"/>
-              <a:t>tự</a:t>
-            </a:r>
-            <a:r>
-              <a:rPr lang="en-US" dirty="0" smtClean="0"/>
-              <a:t> </a:t>
-            </a:r>
-            <a:r>
-              <a:rPr lang="en-US" dirty="0" err="1" smtClean="0"/>
-              <a:t>nhiên</a:t>
-            </a:r>
-            <a:endParaRPr lang="en-US" dirty="0" smtClean="0"/>
-          </a:p>
-          <a:p>
-            <a:r>
-              <a:rPr lang="en-US" dirty="0" err="1" smtClean="0"/>
-              <a:t>Tiến</a:t>
-            </a:r>
-            <a:r>
-              <a:rPr lang="en-US" dirty="0" smtClean="0"/>
-              <a:t> </a:t>
-            </a:r>
-            <a:r>
-              <a:rPr lang="en-US" dirty="0" err="1" smtClean="0"/>
-              <a:t>hành</a:t>
-            </a:r>
-            <a:r>
-              <a:rPr lang="en-US" dirty="0" smtClean="0"/>
-              <a:t> demo </a:t>
-            </a:r>
-            <a:r>
-              <a:rPr lang="en-US" dirty="0" err="1" smtClean="0"/>
-              <a:t>sau</a:t>
-            </a:r>
-            <a:r>
-              <a:rPr lang="en-US" dirty="0" smtClean="0"/>
-              <a:t> </a:t>
-            </a:r>
-            <a:r>
-              <a:rPr lang="en-US" dirty="0" err="1" smtClean="0"/>
-              <a:t>khi</a:t>
-            </a:r>
-            <a:r>
-              <a:rPr lang="en-US" dirty="0" smtClean="0"/>
-              <a:t> </a:t>
-            </a:r>
-            <a:r>
-              <a:rPr lang="en-US" dirty="0" err="1" smtClean="0"/>
-              <a:t>hiện</a:t>
-            </a:r>
-            <a:r>
-              <a:rPr lang="en-US" dirty="0" smtClean="0"/>
-              <a:t> </a:t>
-            </a:r>
-            <a:r>
-              <a:rPr lang="en-US" dirty="0" err="1" smtClean="0"/>
-              <a:t>thực</a:t>
-            </a:r>
-            <a:r>
-              <a:rPr lang="en-US" dirty="0" smtClean="0"/>
-              <a:t> </a:t>
-            </a:r>
-            <a:r>
-              <a:rPr lang="en-US" dirty="0" err="1" smtClean="0"/>
-              <a:t>xong</a:t>
-            </a:r>
-            <a:r>
-              <a:rPr lang="en-US" dirty="0" smtClean="0"/>
-              <a:t> </a:t>
-            </a:r>
-            <a:r>
-              <a:rPr lang="en-US" dirty="0" err="1" smtClean="0"/>
-              <a:t>các</a:t>
-            </a:r>
-            <a:r>
-              <a:rPr lang="en-US" dirty="0" smtClean="0"/>
-              <a:t> </a:t>
-            </a:r>
-            <a:r>
-              <a:rPr lang="en-US" dirty="0" err="1" smtClean="0"/>
-              <a:t>bước</a:t>
-            </a:r>
-            <a:r>
-              <a:rPr lang="en-US" dirty="0" smtClean="0"/>
-              <a:t>.</a:t>
-            </a:r>
-          </a:p>
-          <a:p>
-            <a:r>
-              <a:rPr lang="en-US" dirty="0" err="1" smtClean="0"/>
-              <a:t>Dự</a:t>
-            </a:r>
-            <a:r>
-              <a:rPr lang="en-US" dirty="0" smtClean="0"/>
-              <a:t> </a:t>
-            </a:r>
-            <a:r>
-              <a:rPr lang="en-US" dirty="0" err="1" smtClean="0"/>
-              <a:t>định</a:t>
-            </a:r>
-            <a:r>
-              <a:rPr lang="en-US" dirty="0" smtClean="0"/>
-              <a:t> </a:t>
-            </a:r>
-            <a:r>
-              <a:rPr lang="en-US" dirty="0" err="1" smtClean="0"/>
-              <a:t>tạo</a:t>
-            </a:r>
-            <a:r>
-              <a:rPr lang="en-US" dirty="0" smtClean="0"/>
-              <a:t> </a:t>
-            </a:r>
-            <a:r>
-              <a:rPr lang="en-US" dirty="0" err="1" smtClean="0"/>
-              <a:t>một</a:t>
-            </a:r>
-            <a:r>
-              <a:rPr lang="en-US" dirty="0" smtClean="0"/>
-              <a:t> </a:t>
-            </a:r>
-            <a:r>
-              <a:rPr lang="en-US" dirty="0" err="1" smtClean="0"/>
-              <a:t>bảng</a:t>
-            </a:r>
-            <a:r>
-              <a:rPr lang="en-US" dirty="0" smtClean="0"/>
-              <a:t> </a:t>
-            </a:r>
-            <a:r>
-              <a:rPr lang="en-US" dirty="0" err="1" smtClean="0"/>
-              <a:t>trong</a:t>
-            </a:r>
-            <a:r>
-              <a:rPr lang="en-US" dirty="0" smtClean="0"/>
-              <a:t> CSDL </a:t>
-            </a:r>
-            <a:r>
-              <a:rPr lang="en-US" dirty="0" err="1" smtClean="0"/>
-              <a:t>để</a:t>
-            </a:r>
-            <a:r>
-              <a:rPr lang="en-US" dirty="0" smtClean="0"/>
-              <a:t> </a:t>
-            </a:r>
-            <a:r>
-              <a:rPr lang="en-US" dirty="0" err="1" smtClean="0"/>
-              <a:t>lưu</a:t>
-            </a:r>
-            <a:r>
-              <a:rPr lang="en-US" dirty="0" smtClean="0"/>
-              <a:t> </a:t>
-            </a:r>
-            <a:r>
-              <a:rPr lang="en-US" dirty="0" err="1" smtClean="0"/>
-              <a:t>câu</a:t>
-            </a:r>
-            <a:r>
-              <a:rPr lang="en-US" dirty="0" smtClean="0"/>
-              <a:t> </a:t>
-            </a:r>
-            <a:r>
-              <a:rPr lang="en-US" dirty="0" err="1" smtClean="0"/>
-              <a:t>hỏi</a:t>
-            </a:r>
-            <a:r>
-              <a:rPr lang="en-US" dirty="0" smtClean="0"/>
-              <a:t> </a:t>
-            </a:r>
-            <a:r>
-              <a:rPr lang="en-US" dirty="0" err="1" smtClean="0"/>
-              <a:t>và</a:t>
-            </a:r>
-            <a:r>
-              <a:rPr lang="en-US" dirty="0" smtClean="0"/>
-              <a:t> </a:t>
-            </a:r>
-            <a:r>
-              <a:rPr lang="en-US" dirty="0" err="1" smtClean="0"/>
-              <a:t>câu</a:t>
-            </a:r>
-            <a:r>
-              <a:rPr lang="en-US" dirty="0" smtClean="0"/>
-              <a:t> </a:t>
-            </a:r>
-            <a:r>
-              <a:rPr lang="en-US" dirty="0" err="1" smtClean="0"/>
-              <a:t>truy</a:t>
-            </a:r>
-            <a:r>
-              <a:rPr lang="en-US" dirty="0" smtClean="0"/>
-              <a:t> </a:t>
-            </a:r>
-            <a:r>
-              <a:rPr lang="en-US" dirty="0" err="1" smtClean="0"/>
-              <a:t>vấn</a:t>
-            </a:r>
-            <a:r>
-              <a:rPr lang="en-US" dirty="0" smtClean="0"/>
-              <a:t> </a:t>
-            </a:r>
-            <a:r>
-              <a:rPr lang="en-US" dirty="0" err="1" smtClean="0"/>
-              <a:t>của</a:t>
-            </a:r>
-            <a:r>
-              <a:rPr lang="en-US" dirty="0" smtClean="0"/>
-              <a:t> </a:t>
-            </a:r>
-            <a:r>
-              <a:rPr lang="en-US" dirty="0" err="1" smtClean="0"/>
-              <a:t>người</a:t>
-            </a:r>
-            <a:r>
-              <a:rPr lang="en-US" dirty="0" smtClean="0"/>
-              <a:t> </a:t>
-            </a:r>
-            <a:r>
-              <a:rPr lang="en-US" dirty="0" err="1" smtClean="0"/>
-              <a:t>dùng</a:t>
-            </a:r>
-            <a:r>
-              <a:rPr lang="en-US" dirty="0" smtClean="0"/>
-              <a:t>.</a:t>
-            </a:r>
-          </a:p>
-          <a:p>
-            <a:endParaRPr lang="en-US" dirty="0"/>
+            <a:endParaRPr lang="en-US"/>
           </a:p>
         </p:txBody>
       </p:sp>
+      <p:pic>
+        <p:nvPicPr>
+          <p:cNvPr id="4" name="Picture 2"/>
+          <p:cNvPicPr>
+            <a:picLocks noChangeAspect="1" noChangeArrowheads="1"/>
+          </p:cNvPicPr>
+          <p:nvPr/>
+        </p:nvPicPr>
+        <p:blipFill>
+          <a:blip r:embed="rId2"/>
+          <a:srcRect/>
+          <a:stretch>
+            <a:fillRect/>
+          </a:stretch>
+        </p:blipFill>
+        <p:spPr bwMode="auto">
+          <a:xfrm>
+            <a:off x="228600" y="1219200"/>
+            <a:ext cx="8763000" cy="5181600"/>
+          </a:xfrm>
+          <a:prstGeom prst="rect">
+            <a:avLst/>
+          </a:prstGeom>
+          <a:noFill/>
+          <a:ln w="9525">
+            <a:noFill/>
+            <a:miter lim="800000"/>
+            <a:headEnd/>
+            <a:tailEnd/>
+          </a:ln>
+          <a:effectLst/>
+        </p:spPr>
+      </p:pic>
     </p:spTree>
   </p:cSld>
   <p:clrMapOvr>
@@ -5813,40 +5521,8 @@
           <a:lstStyle/>
           <a:p>
             <a:r>
-              <a:rPr lang="en-US" dirty="0" err="1" smtClean="0"/>
-              <a:t>Các</a:t>
-            </a:r>
-            <a:r>
-              <a:rPr lang="en-US" dirty="0" smtClean="0"/>
-              <a:t> </a:t>
-            </a:r>
-            <a:r>
-              <a:rPr lang="en-US" dirty="0" err="1" smtClean="0"/>
-              <a:t>tài</a:t>
-            </a:r>
-            <a:r>
-              <a:rPr lang="en-US" dirty="0" smtClean="0"/>
-              <a:t> </a:t>
-            </a:r>
-            <a:r>
-              <a:rPr lang="en-US" dirty="0" err="1" smtClean="0"/>
-              <a:t>liệu</a:t>
-            </a:r>
-            <a:r>
-              <a:rPr lang="en-US" dirty="0" smtClean="0"/>
-              <a:t> </a:t>
-            </a:r>
-            <a:r>
-              <a:rPr lang="en-US" dirty="0" err="1" smtClean="0"/>
-              <a:t>tham</a:t>
-            </a:r>
-            <a:r>
-              <a:rPr lang="en-US" dirty="0" smtClean="0"/>
-              <a:t> </a:t>
-            </a:r>
-            <a:r>
-              <a:rPr lang="en-US" dirty="0" err="1" smtClean="0"/>
-              <a:t>khảo</a:t>
+              <a:rPr lang="en-US" dirty="0" smtClean="0"/>
+              <a:t>Các bước đề xuất xử lý câu hỏi tự nhiên</a:t>
             </a:r>
             <a:endParaRPr lang="en-US" dirty="0"/>
           </a:p>
@@ -5862,296 +5538,49 @@
             <p:ph idx="1"/>
           </p:nvPr>
         </p:nvSpPr>
-        <p:spPr>
-          <a:xfrm>
-            <a:off x="457200" y="1219200"/>
-            <a:ext cx="8534400" cy="5181600"/>
-          </a:xfrm>
-        </p:spPr>
+        <p:spPr/>
         <p:txBody>
           <a:bodyPr/>
           <a:lstStyle/>
           <a:p>
             <a:r>
+              <a:rPr lang="en-US" dirty="0" smtClean="0"/>
+              <a:t>Bước tiền xử lý:</a:t>
+            </a:r>
+          </a:p>
+          <a:p>
+            <a:pPr lvl="1"/>
+            <a:r>
+              <a:rPr lang="en-US" dirty="0" smtClean="0"/>
+              <a:t>Thực hiện các thao tác tách từ, xác định thực thể đặt tên và gán nhạn từ loại. Loại bỏ bớt các mạo từ sau : the, a, an.</a:t>
+            </a:r>
+          </a:p>
+          <a:p>
+            <a:pPr lvl="1"/>
+            <a:r>
+              <a:rPr lang="en-US" dirty="0" smtClean="0"/>
+              <a:t>Đưa từ về dạng nguyên mẫu (stemming)</a:t>
+            </a:r>
+          </a:p>
+          <a:p>
+            <a:pPr lvl="1"/>
+            <a:r>
+              <a:rPr lang="en-US" dirty="0" smtClean="0"/>
+              <a:t>Ví dụ:</a:t>
+            </a:r>
+            <a:r>
+              <a:rPr lang="en-US" sz="2400" i="1" dirty="0" smtClean="0"/>
+              <a:t>“Which books were written by Rafiul Ahad and Amelia Carlson in 2010 ?”</a:t>
+            </a:r>
+          </a:p>
+          <a:p>
+            <a:pPr lvl="1">
+              <a:buNone/>
+            </a:pPr>
+            <a:r>
               <a:rPr lang="en-US" sz="2400" dirty="0" smtClean="0"/>
-              <a:t>[1] </a:t>
-            </a:r>
-            <a:r>
-              <a:rPr lang="en-US" sz="2400" dirty="0" smtClean="0">
-                <a:hlinkClick r:id="rId2"/>
-              </a:rPr>
-              <a:t>http://www.informatik.uni-trier.de/~ley/db/</a:t>
-            </a:r>
-            <a:endParaRPr lang="en-US" sz="2400" dirty="0" smtClean="0"/>
-          </a:p>
-          <a:p>
-            <a:r>
-              <a:rPr lang="en-US" sz="2400" dirty="0" smtClean="0"/>
-              <a:t>[2] </a:t>
-            </a:r>
-            <a:r>
-              <a:rPr lang="en-US" sz="2400" u="sng" dirty="0" smtClean="0">
-                <a:hlinkClick r:id="rId3"/>
-              </a:rPr>
-              <a:t>http://en.wikipedia.org/wiki/Question#Types</a:t>
-            </a:r>
-            <a:endParaRPr lang="en-US" sz="2400" dirty="0" smtClean="0"/>
-          </a:p>
-          <a:p>
-            <a:r>
-              <a:rPr lang="en-US" sz="2400" dirty="0" smtClean="0"/>
-              <a:t>[3] </a:t>
-            </a:r>
-            <a:r>
-              <a:rPr lang="en-US" sz="2400" u="sng" dirty="0" smtClean="0">
-                <a:hlinkClick r:id="rId4"/>
-              </a:rPr>
-              <a:t>http://www.englishclub.com/grammar/verbs-questions_types.htm</a:t>
-            </a:r>
-            <a:r>
-              <a:rPr lang="en-US" sz="2400" dirty="0" smtClean="0"/>
-              <a:t> </a:t>
-            </a:r>
-          </a:p>
-          <a:p>
-            <a:r>
-              <a:rPr lang="en-US" sz="2400" dirty="0" smtClean="0"/>
-              <a:t>[4] </a:t>
-            </a:r>
-            <a:r>
-              <a:rPr lang="en-US" sz="2400" u="sng" dirty="0" smtClean="0">
-                <a:hlinkClick r:id="rId5"/>
-              </a:rPr>
-              <a:t>http://oxforddictionaries.com/view/entry/m_en_gb0680290#m_en_gb0680290</a:t>
-            </a:r>
-            <a:r>
-              <a:rPr lang="en-US" sz="2400" dirty="0" smtClean="0"/>
-              <a:t> </a:t>
-            </a:r>
-          </a:p>
-          <a:p>
-            <a:r>
-              <a:rPr lang="en-US" sz="2400" dirty="0" smtClean="0"/>
-              <a:t>[5] </a:t>
-            </a:r>
-            <a:r>
-              <a:rPr lang="en-US" sz="2400" u="sng" dirty="0" smtClean="0">
-                <a:hlinkClick r:id="rId6"/>
-              </a:rPr>
-              <a:t>http://www.learnenglish.de/grammar/questiontext.htm</a:t>
-            </a:r>
-            <a:r>
-              <a:rPr lang="en-US" sz="2400" dirty="0" smtClean="0"/>
-              <a:t> </a:t>
-            </a:r>
-            <a:endParaRPr lang="en-US" sz="2400" dirty="0" smtClean="0"/>
-          </a:p>
-          <a:p>
-            <a:r>
-              <a:rPr lang="en-US" sz="2400" dirty="0" smtClean="0"/>
-              <a:t>[6] “A </a:t>
-            </a:r>
-            <a:r>
-              <a:rPr lang="en-US" sz="2400" dirty="0" smtClean="0"/>
-              <a:t>Question Answering System based on Conceptual Graph Formalism”, </a:t>
-            </a:r>
-            <a:r>
-              <a:rPr lang="en-US" sz="2400" dirty="0" err="1" smtClean="0"/>
-              <a:t>Wael</a:t>
-            </a:r>
-            <a:r>
-              <a:rPr lang="en-US" sz="2400" dirty="0" smtClean="0"/>
-              <a:t> </a:t>
-            </a:r>
-            <a:r>
-              <a:rPr lang="en-US" sz="2400" dirty="0" err="1" smtClean="0"/>
-              <a:t>Salloum</a:t>
-            </a:r>
-            <a:r>
-              <a:rPr lang="en-US" sz="2400" dirty="0" smtClean="0"/>
-              <a:t> , 2009</a:t>
-            </a:r>
-            <a:r>
-              <a:rPr lang="en-US" sz="2400" dirty="0" smtClean="0"/>
-              <a:t>.</a:t>
-            </a:r>
-          </a:p>
-          <a:p>
-            <a:r>
-              <a:rPr lang="en-US" sz="2400" dirty="0" smtClean="0"/>
-              <a:t>[7] “ </a:t>
-            </a:r>
-            <a:r>
-              <a:rPr lang="en-US" sz="2400" dirty="0" err="1" smtClean="0"/>
-              <a:t>Dịch</a:t>
-            </a:r>
-            <a:r>
-              <a:rPr lang="en-US" sz="2400" dirty="0" smtClean="0"/>
-              <a:t> </a:t>
-            </a:r>
-            <a:r>
-              <a:rPr lang="en-US" sz="2400" dirty="0" err="1" smtClean="0"/>
-              <a:t>câu</a:t>
-            </a:r>
-            <a:r>
-              <a:rPr lang="en-US" sz="2400" dirty="0" smtClean="0"/>
-              <a:t> </a:t>
-            </a:r>
-            <a:r>
-              <a:rPr lang="en-US" sz="2400" dirty="0" err="1" smtClean="0"/>
-              <a:t>truy</a:t>
-            </a:r>
-            <a:r>
-              <a:rPr lang="en-US" sz="2400" dirty="0" smtClean="0"/>
-              <a:t> </a:t>
-            </a:r>
-            <a:r>
-              <a:rPr lang="en-US" sz="2400" dirty="0" err="1" smtClean="0"/>
-              <a:t>vấn</a:t>
-            </a:r>
-            <a:r>
-              <a:rPr lang="en-US" sz="2400" dirty="0" smtClean="0"/>
-              <a:t> </a:t>
-            </a:r>
-            <a:r>
-              <a:rPr lang="en-US" sz="2400" dirty="0" err="1" smtClean="0"/>
-              <a:t>có</a:t>
-            </a:r>
-            <a:r>
-              <a:rPr lang="en-US" sz="2400" dirty="0" smtClean="0"/>
-              <a:t> </a:t>
-            </a:r>
-            <a:r>
-              <a:rPr lang="en-US" sz="2400" dirty="0" err="1" smtClean="0"/>
-              <a:t>cấu</a:t>
-            </a:r>
-            <a:r>
-              <a:rPr lang="en-US" sz="2400" dirty="0" smtClean="0"/>
-              <a:t> </a:t>
-            </a:r>
-            <a:r>
-              <a:rPr lang="en-US" sz="2400" dirty="0" err="1" smtClean="0"/>
-              <a:t>trúc</a:t>
-            </a:r>
-            <a:r>
-              <a:rPr lang="en-US" sz="2400" dirty="0" smtClean="0"/>
-              <a:t> sang </a:t>
-            </a:r>
-            <a:r>
-              <a:rPr lang="en-US" sz="2400" dirty="0" err="1" smtClean="0"/>
-              <a:t>đồ</a:t>
-            </a:r>
-            <a:r>
-              <a:rPr lang="en-US" sz="2400" dirty="0" smtClean="0"/>
-              <a:t> </a:t>
-            </a:r>
-            <a:r>
-              <a:rPr lang="en-US" sz="2400" dirty="0" err="1" smtClean="0"/>
-              <a:t>thị</a:t>
-            </a:r>
-            <a:r>
-              <a:rPr lang="en-US" sz="2400" dirty="0" smtClean="0"/>
-              <a:t> ý </a:t>
-            </a:r>
-            <a:r>
-              <a:rPr lang="en-US" sz="2400" dirty="0" err="1" smtClean="0"/>
-              <a:t>niệm</a:t>
-            </a:r>
-            <a:r>
-              <a:rPr lang="en-US" sz="2400" dirty="0" smtClean="0"/>
-              <a:t>: </a:t>
-            </a:r>
-            <a:r>
-              <a:rPr lang="en-US" sz="2400" dirty="0" err="1" smtClean="0"/>
-              <a:t>cách</a:t>
-            </a:r>
-            <a:r>
-              <a:rPr lang="en-US" sz="2400" dirty="0" smtClean="0"/>
-              <a:t> </a:t>
-            </a:r>
-            <a:r>
-              <a:rPr lang="en-US" sz="2400" dirty="0" err="1" smtClean="0"/>
-              <a:t>tiếp</a:t>
-            </a:r>
-            <a:r>
-              <a:rPr lang="en-US" sz="2400" dirty="0" smtClean="0"/>
-              <a:t> </a:t>
-            </a:r>
-            <a:r>
-              <a:rPr lang="en-US" sz="2400" dirty="0" err="1" smtClean="0"/>
-              <a:t>cận</a:t>
-            </a:r>
-            <a:r>
-              <a:rPr lang="en-US" sz="2400" dirty="0" smtClean="0"/>
-              <a:t> </a:t>
-            </a:r>
-            <a:r>
-              <a:rPr lang="en-US" sz="2400" dirty="0" err="1" smtClean="0"/>
-              <a:t>ít</a:t>
-            </a:r>
-            <a:r>
-              <a:rPr lang="en-US" sz="2400" dirty="0" smtClean="0"/>
-              <a:t> </a:t>
-            </a:r>
-            <a:r>
-              <a:rPr lang="en-US" sz="2400" dirty="0" err="1" smtClean="0"/>
-              <a:t>phụ</a:t>
-            </a:r>
-            <a:r>
-              <a:rPr lang="en-US" sz="2400" dirty="0" smtClean="0"/>
-              <a:t> </a:t>
-            </a:r>
-            <a:r>
-              <a:rPr lang="en-US" sz="2400" dirty="0" err="1" smtClean="0"/>
-              <a:t>thuộc</a:t>
-            </a:r>
-            <a:r>
-              <a:rPr lang="en-US" sz="2400" dirty="0" smtClean="0"/>
-              <a:t> </a:t>
-            </a:r>
-            <a:r>
-              <a:rPr lang="en-US" sz="2400" dirty="0" err="1" smtClean="0"/>
-              <a:t>vào</a:t>
-            </a:r>
-            <a:r>
-              <a:rPr lang="en-US" sz="2400" dirty="0" smtClean="0"/>
-              <a:t> </a:t>
-            </a:r>
-            <a:r>
-              <a:rPr lang="en-US" sz="2400" dirty="0" err="1" smtClean="0"/>
-              <a:t>cú</a:t>
-            </a:r>
-            <a:r>
-              <a:rPr lang="en-US" sz="2400" dirty="0" smtClean="0"/>
-              <a:t> </a:t>
-            </a:r>
-            <a:r>
-              <a:rPr lang="en-US" sz="2400" dirty="0" err="1" smtClean="0"/>
-              <a:t>pháp</a:t>
-            </a:r>
-            <a:r>
-              <a:rPr lang="en-US" sz="2400" dirty="0" smtClean="0"/>
-              <a:t>”, Cao </a:t>
-            </a:r>
-            <a:r>
-              <a:rPr lang="en-US" sz="2400" dirty="0" err="1" smtClean="0"/>
-              <a:t>Duy</a:t>
-            </a:r>
-            <a:r>
-              <a:rPr lang="en-US" sz="2400" dirty="0" smtClean="0"/>
-              <a:t> </a:t>
-            </a:r>
-            <a:r>
-              <a:rPr lang="en-US" sz="2400" dirty="0" err="1" smtClean="0"/>
-              <a:t>Trường</a:t>
-            </a:r>
-            <a:r>
-              <a:rPr lang="en-US" sz="2400" dirty="0" smtClean="0"/>
-              <a:t>, 2008.</a:t>
-            </a:r>
-          </a:p>
-          <a:p>
-            <a:endParaRPr lang="en-US" sz="2400" dirty="0" smtClean="0"/>
+              <a:t>=&gt; WDT/Which NNS/books VB/be VB/write IN/by NNP/Rafiul Ahad CC/and NNP/Amelia Carlson IN/in CD/2010</a:t>
+            </a:r>
           </a:p>
           <a:p>
             <a:endParaRPr lang="en-US" dirty="0"/>
@@ -6199,6 +5628,847 @@
           <a:lstStyle/>
           <a:p>
             <a:r>
+              <a:rPr lang="en-US" dirty="0" smtClean="0"/>
+              <a:t>Các bước đề xuất xử lý câu hỏi tự nhiên</a:t>
+            </a:r>
+            <a:endParaRPr lang="en-US" dirty="0"/>
+          </a:p>
+        </p:txBody>
+      </p:sp>
+      <p:sp>
+        <p:nvSpPr>
+          <p:cNvPr id="3" name="Content Placeholder 2"/>
+          <p:cNvSpPr>
+            <a:spLocks noGrp="1"/>
+          </p:cNvSpPr>
+          <p:nvPr>
+            <p:ph idx="1"/>
+          </p:nvPr>
+        </p:nvSpPr>
+        <p:spPr/>
+        <p:txBody>
+          <a:bodyPr/>
+          <a:lstStyle/>
+          <a:p>
+            <a:r>
+              <a:rPr lang="en-US" dirty="0" smtClean="0"/>
+              <a:t>Liệt kê các bộ ba quan hệ về từ</a:t>
+            </a:r>
+          </a:p>
+          <a:p>
+            <a:pPr lvl="1"/>
+            <a:r>
+              <a:rPr lang="en-US" dirty="0" smtClean="0"/>
+              <a:t>Dựa trên các luật về từ loại mà nhóm đề ra .</a:t>
+            </a:r>
+          </a:p>
+          <a:p>
+            <a:pPr lvl="1"/>
+            <a:r>
+              <a:rPr lang="en-US" dirty="0" smtClean="0"/>
+              <a:t>Ví dụ: (tiếp theo)</a:t>
+            </a:r>
+          </a:p>
+          <a:p>
+            <a:pPr lvl="1">
+              <a:buNone/>
+            </a:pPr>
+            <a:r>
+              <a:rPr lang="en-US" sz="2000" i="1" dirty="0" smtClean="0"/>
+              <a:t>“</a:t>
+            </a:r>
+            <a:r>
+              <a:rPr lang="en-US" sz="2000" b="1" i="1" dirty="0" smtClean="0"/>
+              <a:t>WDT/Which </a:t>
+            </a:r>
+            <a:r>
+              <a:rPr lang="en-US" sz="2000" b="1" i="1" dirty="0" smtClean="0">
+                <a:solidFill>
+                  <a:srgbClr val="FFFF00"/>
+                </a:solidFill>
+              </a:rPr>
+              <a:t>NNS/books VB/be VB/write IN/by NNP/Rafiul Ahad </a:t>
+            </a:r>
+          </a:p>
+          <a:p>
+            <a:pPr lvl="1">
+              <a:buNone/>
+            </a:pPr>
+            <a:r>
+              <a:rPr lang="en-US" sz="2000" b="1" i="1" dirty="0" smtClean="0">
+                <a:solidFill>
+                  <a:srgbClr val="FFFF00"/>
+                </a:solidFill>
+              </a:rPr>
+              <a:t>CC/and NNP/Amelia Carlson</a:t>
+            </a:r>
+            <a:r>
+              <a:rPr lang="en-US" sz="2000" b="1" i="1" dirty="0" smtClean="0"/>
+              <a:t> IN/in CD/2010”</a:t>
+            </a:r>
+          </a:p>
+          <a:p>
+            <a:pPr lvl="1">
+              <a:buNone/>
+            </a:pPr>
+            <a:r>
+              <a:rPr lang="en-US" sz="2000" dirty="0" smtClean="0"/>
+              <a:t>Sử dụng Luật </a:t>
+            </a:r>
+          </a:p>
+          <a:p>
+            <a:pPr lvl="1">
+              <a:buNone/>
+            </a:pPr>
+            <a:r>
+              <a:rPr lang="en-US" sz="2000" dirty="0" smtClean="0"/>
+              <a:t>NNS  VB VB IN NNP -&gt; NNS,VB VB , NNP</a:t>
+            </a:r>
+          </a:p>
+          <a:p>
+            <a:pPr lvl="1">
+              <a:buNone/>
+            </a:pPr>
+            <a:r>
+              <a:rPr lang="en-US" sz="2000" dirty="0" smtClean="0"/>
+              <a:t>Ta được :</a:t>
+            </a:r>
+          </a:p>
+          <a:p>
+            <a:pPr lvl="1">
+              <a:buNone/>
+            </a:pPr>
+            <a:r>
+              <a:rPr lang="en-US" sz="2000" dirty="0" smtClean="0"/>
+              <a:t>&lt;books,be write,Rafiul Ahad&gt;</a:t>
+            </a:r>
+          </a:p>
+          <a:p>
+            <a:pPr lvl="1">
+              <a:buNone/>
+            </a:pPr>
+            <a:r>
+              <a:rPr lang="en-US" sz="2000" dirty="0" smtClean="0"/>
+              <a:t>&lt;books,be write,Amelia Carlson&gt;</a:t>
+            </a:r>
+          </a:p>
+          <a:p>
+            <a:pPr lvl="1"/>
+            <a:endParaRPr lang="en-US" dirty="0"/>
+          </a:p>
+        </p:txBody>
+      </p:sp>
+    </p:spTree>
+  </p:cSld>
+  <p:clrMapOvr>
+    <a:masterClrMapping/>
+  </p:clrMapOvr>
+</p:sld>
+</file>
+
+<file path=ppt/slides/slide15.xml><?xml version="1.0" encoding="utf-8"?>
+<p:sld xmlns:a="http://schemas.openxmlformats.org/drawingml/2006/main" xmlns:r="http://schemas.openxmlformats.org/officeDocument/2006/relationships" xmlns:p="http://schemas.openxmlformats.org/presentationml/2006/main">
+  <p:cSld>
+    <p:spTree>
+      <p:nvGrpSpPr>
+        <p:cNvPr id="1" name=""/>
+        <p:cNvGrpSpPr/>
+        <p:nvPr/>
+      </p:nvGrpSpPr>
+      <p:grpSpPr>
+        <a:xfrm>
+          <a:off x="0" y="0"/>
+          <a:ext cx="0" cy="0"/>
+          <a:chOff x="0" y="0"/>
+          <a:chExt cx="0" cy="0"/>
+        </a:xfrm>
+      </p:grpSpPr>
+      <p:sp>
+        <p:nvSpPr>
+          <p:cNvPr id="2" name="Title 1"/>
+          <p:cNvSpPr>
+            <a:spLocks noGrp="1"/>
+          </p:cNvSpPr>
+          <p:nvPr>
+            <p:ph type="title"/>
+          </p:nvPr>
+        </p:nvSpPr>
+        <p:spPr/>
+        <p:txBody>
+          <a:bodyPr/>
+          <a:lstStyle/>
+          <a:p>
+            <a:r>
+              <a:rPr lang="en-US" dirty="0" err="1" smtClean="0"/>
+              <a:t>Các</a:t>
+            </a:r>
+            <a:r>
+              <a:rPr lang="en-US" dirty="0" smtClean="0"/>
+              <a:t> </a:t>
+            </a:r>
+            <a:r>
+              <a:rPr lang="en-US" dirty="0" err="1" smtClean="0"/>
+              <a:t>công</a:t>
+            </a:r>
+            <a:r>
+              <a:rPr lang="en-US" dirty="0" smtClean="0"/>
+              <a:t> </a:t>
+            </a:r>
+            <a:r>
+              <a:rPr lang="en-US" dirty="0" err="1" smtClean="0"/>
+              <a:t>việc</a:t>
+            </a:r>
+            <a:r>
+              <a:rPr lang="en-US" dirty="0" smtClean="0"/>
+              <a:t> </a:t>
+            </a:r>
+            <a:r>
+              <a:rPr lang="en-US" dirty="0" err="1" smtClean="0"/>
+              <a:t>sắp</a:t>
+            </a:r>
+            <a:r>
+              <a:rPr lang="en-US" dirty="0" smtClean="0"/>
+              <a:t> </a:t>
+            </a:r>
+            <a:r>
+              <a:rPr lang="en-US" dirty="0" err="1" smtClean="0"/>
+              <a:t>tới</a:t>
+            </a:r>
+            <a:endParaRPr lang="en-US" dirty="0"/>
+          </a:p>
+        </p:txBody>
+      </p:sp>
+      <p:sp>
+        <p:nvSpPr>
+          <p:cNvPr id="3" name="Content Placeholder 2"/>
+          <p:cNvSpPr>
+            <a:spLocks noGrp="1"/>
+          </p:cNvSpPr>
+          <p:nvPr>
+            <p:ph idx="1"/>
+          </p:nvPr>
+        </p:nvSpPr>
+        <p:spPr/>
+        <p:txBody>
+          <a:bodyPr/>
+          <a:lstStyle/>
+          <a:p>
+            <a:r>
+              <a:rPr lang="en-US" dirty="0" err="1" smtClean="0"/>
+              <a:t>Hiện</a:t>
+            </a:r>
+            <a:r>
+              <a:rPr lang="en-US" dirty="0" smtClean="0"/>
+              <a:t> </a:t>
+            </a:r>
+            <a:r>
+              <a:rPr lang="en-US" dirty="0" err="1" smtClean="0"/>
+              <a:t>thực</a:t>
+            </a:r>
+            <a:r>
+              <a:rPr lang="en-US" dirty="0" smtClean="0"/>
+              <a:t> </a:t>
+            </a:r>
+            <a:r>
+              <a:rPr lang="en-US" dirty="0" err="1" smtClean="0"/>
+              <a:t>các</a:t>
+            </a:r>
+            <a:r>
+              <a:rPr lang="en-US" dirty="0" smtClean="0"/>
+              <a:t> </a:t>
+            </a:r>
+            <a:r>
+              <a:rPr lang="en-US" dirty="0" err="1" smtClean="0"/>
+              <a:t>bước</a:t>
+            </a:r>
+            <a:r>
+              <a:rPr lang="en-US" dirty="0" smtClean="0"/>
+              <a:t> </a:t>
+            </a:r>
+            <a:r>
+              <a:rPr lang="en-US" dirty="0" err="1" smtClean="0"/>
+              <a:t>xử</a:t>
+            </a:r>
+            <a:r>
+              <a:rPr lang="en-US" dirty="0" smtClean="0"/>
+              <a:t> </a:t>
+            </a:r>
+            <a:r>
+              <a:rPr lang="en-US" dirty="0" err="1" smtClean="0"/>
+              <a:t>lý</a:t>
+            </a:r>
+            <a:r>
+              <a:rPr lang="en-US" dirty="0" smtClean="0"/>
+              <a:t> </a:t>
+            </a:r>
+            <a:r>
+              <a:rPr lang="en-US" dirty="0" err="1" smtClean="0"/>
+              <a:t>theo</a:t>
+            </a:r>
+            <a:r>
+              <a:rPr lang="en-US" dirty="0" smtClean="0"/>
+              <a:t> </a:t>
+            </a:r>
+            <a:r>
+              <a:rPr lang="en-US" dirty="0" err="1" smtClean="0"/>
+              <a:t>đề</a:t>
+            </a:r>
+            <a:r>
+              <a:rPr lang="en-US" dirty="0" smtClean="0"/>
+              <a:t> </a:t>
+            </a:r>
+            <a:r>
+              <a:rPr lang="en-US" dirty="0" err="1" smtClean="0"/>
+              <a:t>xuất</a:t>
+            </a:r>
+            <a:r>
+              <a:rPr lang="en-US" dirty="0" smtClean="0"/>
+              <a:t> </a:t>
+            </a:r>
+            <a:r>
+              <a:rPr lang="en-US" dirty="0" err="1" smtClean="0"/>
+              <a:t>để</a:t>
+            </a:r>
+            <a:r>
+              <a:rPr lang="en-US" dirty="0" smtClean="0"/>
+              <a:t> </a:t>
+            </a:r>
+            <a:r>
+              <a:rPr lang="en-US" dirty="0" err="1" smtClean="0"/>
+              <a:t>xử</a:t>
+            </a:r>
+            <a:r>
+              <a:rPr lang="en-US" dirty="0" smtClean="0"/>
+              <a:t> </a:t>
+            </a:r>
+            <a:r>
+              <a:rPr lang="en-US" dirty="0" err="1" smtClean="0"/>
+              <a:t>lý</a:t>
+            </a:r>
+            <a:r>
+              <a:rPr lang="en-US" dirty="0" smtClean="0"/>
+              <a:t> </a:t>
+            </a:r>
+            <a:r>
+              <a:rPr lang="en-US" dirty="0" err="1" smtClean="0"/>
+              <a:t>câu</a:t>
+            </a:r>
+            <a:r>
+              <a:rPr lang="en-US" dirty="0" smtClean="0"/>
+              <a:t> </a:t>
+            </a:r>
+            <a:r>
+              <a:rPr lang="en-US" dirty="0" err="1" smtClean="0"/>
+              <a:t>hỏi</a:t>
+            </a:r>
+            <a:r>
+              <a:rPr lang="en-US" dirty="0" smtClean="0"/>
+              <a:t> </a:t>
+            </a:r>
+            <a:r>
+              <a:rPr lang="en-US" dirty="0" err="1" smtClean="0"/>
+              <a:t>tự</a:t>
+            </a:r>
+            <a:r>
+              <a:rPr lang="en-US" dirty="0" smtClean="0"/>
+              <a:t> </a:t>
+            </a:r>
+            <a:r>
+              <a:rPr lang="en-US" dirty="0" err="1" smtClean="0"/>
+              <a:t>nhiên</a:t>
+            </a:r>
+            <a:r>
+              <a:rPr lang="en-US" dirty="0" smtClean="0"/>
+              <a:t>. </a:t>
+            </a:r>
+            <a:r>
+              <a:rPr lang="en-US" dirty="0" err="1" smtClean="0"/>
+              <a:t>Cụ</a:t>
+            </a:r>
+            <a:r>
+              <a:rPr lang="en-US" dirty="0" smtClean="0"/>
+              <a:t> </a:t>
+            </a:r>
+            <a:r>
+              <a:rPr lang="en-US" dirty="0" err="1" smtClean="0"/>
+              <a:t>thể</a:t>
+            </a:r>
+            <a:r>
+              <a:rPr lang="en-US" dirty="0" smtClean="0"/>
+              <a:t> </a:t>
+            </a:r>
+            <a:r>
+              <a:rPr lang="en-US" dirty="0" err="1" smtClean="0"/>
+              <a:t>đã</a:t>
+            </a:r>
+            <a:r>
+              <a:rPr lang="en-US" dirty="0" smtClean="0"/>
+              <a:t> </a:t>
+            </a:r>
+            <a:r>
+              <a:rPr lang="en-US" dirty="0" err="1" smtClean="0"/>
+              <a:t>hoàn</a:t>
+            </a:r>
+            <a:r>
+              <a:rPr lang="en-US" dirty="0" smtClean="0"/>
+              <a:t> </a:t>
+            </a:r>
+            <a:r>
+              <a:rPr lang="en-US" dirty="0" err="1" smtClean="0"/>
+              <a:t>tất</a:t>
+            </a:r>
+            <a:r>
+              <a:rPr lang="en-US" dirty="0" smtClean="0"/>
+              <a:t> 2 </a:t>
+            </a:r>
+            <a:r>
+              <a:rPr lang="en-US" dirty="0" err="1" smtClean="0"/>
+              <a:t>bước</a:t>
+            </a:r>
+            <a:r>
+              <a:rPr lang="en-US" dirty="0" smtClean="0"/>
+              <a:t> </a:t>
+            </a:r>
+            <a:r>
+              <a:rPr lang="en-US" dirty="0" err="1" smtClean="0"/>
+              <a:t>tiền</a:t>
+            </a:r>
+            <a:r>
+              <a:rPr lang="en-US" dirty="0" smtClean="0"/>
+              <a:t> </a:t>
+            </a:r>
+            <a:r>
+              <a:rPr lang="en-US" dirty="0" err="1" smtClean="0"/>
+              <a:t>xử</a:t>
+            </a:r>
+            <a:r>
+              <a:rPr lang="en-US" dirty="0" smtClean="0"/>
+              <a:t> </a:t>
+            </a:r>
+            <a:r>
+              <a:rPr lang="en-US" dirty="0" err="1" smtClean="0"/>
+              <a:t>lý</a:t>
+            </a:r>
+            <a:r>
+              <a:rPr lang="en-US" dirty="0" smtClean="0"/>
+              <a:t> </a:t>
+            </a:r>
+            <a:r>
+              <a:rPr lang="en-US" dirty="0" err="1" smtClean="0"/>
+              <a:t>và</a:t>
+            </a:r>
+            <a:r>
+              <a:rPr lang="en-US" dirty="0" smtClean="0"/>
+              <a:t> </a:t>
+            </a:r>
+            <a:r>
+              <a:rPr lang="en-US" dirty="0" err="1" smtClean="0"/>
+              <a:t>liệt</a:t>
+            </a:r>
+            <a:r>
+              <a:rPr lang="en-US" dirty="0" smtClean="0"/>
+              <a:t> </a:t>
+            </a:r>
+            <a:r>
+              <a:rPr lang="en-US" dirty="0" err="1" smtClean="0"/>
+              <a:t>kê</a:t>
+            </a:r>
+            <a:r>
+              <a:rPr lang="en-US" dirty="0" smtClean="0"/>
+              <a:t> </a:t>
+            </a:r>
+            <a:r>
+              <a:rPr lang="en-US" dirty="0" err="1" smtClean="0"/>
+              <a:t>bộ</a:t>
+            </a:r>
+            <a:r>
+              <a:rPr lang="en-US" dirty="0" smtClean="0"/>
+              <a:t> </a:t>
+            </a:r>
+            <a:r>
+              <a:rPr lang="en-US" dirty="0" err="1" smtClean="0"/>
+              <a:t>ba</a:t>
+            </a:r>
+            <a:r>
+              <a:rPr lang="en-US" dirty="0" smtClean="0"/>
+              <a:t> </a:t>
+            </a:r>
+            <a:r>
+              <a:rPr lang="en-US" dirty="0" smtClean="0"/>
+              <a:t>=&gt; </a:t>
+            </a:r>
+            <a:r>
+              <a:rPr lang="en-US" dirty="0" err="1" smtClean="0"/>
+              <a:t>hướng</a:t>
+            </a:r>
+            <a:r>
+              <a:rPr lang="en-US" dirty="0" smtClean="0"/>
+              <a:t> </a:t>
+            </a:r>
+            <a:r>
+              <a:rPr lang="en-US" dirty="0" err="1" smtClean="0"/>
+              <a:t>tới</a:t>
+            </a:r>
+            <a:r>
+              <a:rPr lang="en-US" dirty="0" smtClean="0"/>
+              <a:t> </a:t>
+            </a:r>
+            <a:r>
+              <a:rPr lang="en-US" dirty="0" err="1" smtClean="0"/>
+              <a:t>hoàn</a:t>
+            </a:r>
+            <a:r>
+              <a:rPr lang="en-US" dirty="0" smtClean="0"/>
+              <a:t> </a:t>
+            </a:r>
+            <a:r>
+              <a:rPr lang="en-US" dirty="0" err="1" smtClean="0"/>
+              <a:t>tất</a:t>
+            </a:r>
+            <a:r>
+              <a:rPr lang="en-US" dirty="0" smtClean="0"/>
+              <a:t> 2 </a:t>
+            </a:r>
+            <a:r>
+              <a:rPr lang="en-US" dirty="0" err="1" smtClean="0"/>
+              <a:t>bước</a:t>
+            </a:r>
+            <a:r>
+              <a:rPr lang="en-US" dirty="0" smtClean="0"/>
+              <a:t> </a:t>
+            </a:r>
+            <a:r>
+              <a:rPr lang="en-US" dirty="0" err="1" smtClean="0"/>
+              <a:t>nhận</a:t>
+            </a:r>
+            <a:r>
+              <a:rPr lang="en-US" dirty="0" smtClean="0"/>
+              <a:t> </a:t>
+            </a:r>
+            <a:r>
+              <a:rPr lang="en-US" dirty="0" err="1" smtClean="0"/>
+              <a:t>diện</a:t>
+            </a:r>
+            <a:r>
+              <a:rPr lang="en-US" dirty="0" smtClean="0"/>
+              <a:t> </a:t>
+            </a:r>
+            <a:r>
+              <a:rPr lang="en-US" dirty="0" err="1" smtClean="0"/>
+              <a:t>thực</a:t>
+            </a:r>
+            <a:r>
+              <a:rPr lang="en-US" dirty="0" smtClean="0"/>
+              <a:t> </a:t>
+            </a:r>
+            <a:r>
+              <a:rPr lang="en-US" dirty="0" err="1" smtClean="0"/>
+              <a:t>thể</a:t>
+            </a:r>
+            <a:r>
+              <a:rPr lang="en-US" dirty="0" smtClean="0"/>
+              <a:t> </a:t>
+            </a:r>
+            <a:r>
+              <a:rPr lang="en-US" dirty="0" err="1" smtClean="0"/>
+              <a:t>và</a:t>
+            </a:r>
+            <a:r>
+              <a:rPr lang="en-US" dirty="0" smtClean="0"/>
+              <a:t> </a:t>
+            </a:r>
+            <a:r>
+              <a:rPr lang="en-US" dirty="0" err="1" smtClean="0"/>
+              <a:t>tạo</a:t>
+            </a:r>
+            <a:r>
+              <a:rPr lang="en-US" dirty="0" smtClean="0"/>
+              <a:t> </a:t>
+            </a:r>
+            <a:r>
+              <a:rPr lang="en-US" dirty="0" err="1" smtClean="0"/>
+              <a:t>câu</a:t>
+            </a:r>
+            <a:r>
+              <a:rPr lang="en-US" dirty="0" smtClean="0"/>
+              <a:t> </a:t>
+            </a:r>
+            <a:r>
+              <a:rPr lang="en-US" dirty="0" err="1" smtClean="0"/>
+              <a:t>truy</a:t>
+            </a:r>
+            <a:r>
+              <a:rPr lang="en-US" dirty="0" smtClean="0"/>
+              <a:t> </a:t>
+            </a:r>
+            <a:r>
+              <a:rPr lang="en-US" dirty="0" err="1" smtClean="0"/>
+              <a:t>vấn</a:t>
+            </a:r>
+            <a:r>
+              <a:rPr lang="en-US" dirty="0" smtClean="0"/>
+              <a:t>.</a:t>
+            </a:r>
+            <a:endParaRPr lang="en-US" dirty="0" smtClean="0"/>
+          </a:p>
+          <a:p>
+            <a:r>
+              <a:rPr lang="en-US" dirty="0" err="1" smtClean="0"/>
+              <a:t>Tiến</a:t>
+            </a:r>
+            <a:r>
+              <a:rPr lang="en-US" dirty="0" smtClean="0"/>
+              <a:t> </a:t>
+            </a:r>
+            <a:r>
+              <a:rPr lang="en-US" dirty="0" err="1" smtClean="0"/>
+              <a:t>hành</a:t>
+            </a:r>
+            <a:r>
+              <a:rPr lang="en-US" dirty="0" smtClean="0"/>
+              <a:t> demo </a:t>
+            </a:r>
+            <a:r>
+              <a:rPr lang="en-US" dirty="0" err="1" smtClean="0"/>
+              <a:t>sau</a:t>
+            </a:r>
+            <a:r>
+              <a:rPr lang="en-US" dirty="0" smtClean="0"/>
+              <a:t> </a:t>
+            </a:r>
+            <a:r>
+              <a:rPr lang="en-US" dirty="0" err="1" smtClean="0"/>
+              <a:t>khi</a:t>
+            </a:r>
+            <a:r>
+              <a:rPr lang="en-US" dirty="0" smtClean="0"/>
+              <a:t> </a:t>
+            </a:r>
+            <a:r>
+              <a:rPr lang="en-US" dirty="0" err="1" smtClean="0"/>
+              <a:t>hiện</a:t>
+            </a:r>
+            <a:r>
+              <a:rPr lang="en-US" dirty="0" smtClean="0"/>
+              <a:t> </a:t>
+            </a:r>
+            <a:r>
+              <a:rPr lang="en-US" dirty="0" err="1" smtClean="0"/>
+              <a:t>thực</a:t>
+            </a:r>
+            <a:r>
+              <a:rPr lang="en-US" dirty="0" smtClean="0"/>
+              <a:t> </a:t>
+            </a:r>
+            <a:r>
+              <a:rPr lang="en-US" dirty="0" err="1" smtClean="0"/>
+              <a:t>xong</a:t>
+            </a:r>
+            <a:r>
+              <a:rPr lang="en-US" dirty="0" smtClean="0"/>
+              <a:t> </a:t>
+            </a:r>
+            <a:r>
+              <a:rPr lang="en-US" dirty="0" err="1" smtClean="0"/>
+              <a:t>các</a:t>
+            </a:r>
+            <a:r>
+              <a:rPr lang="en-US" dirty="0" smtClean="0"/>
+              <a:t> </a:t>
+            </a:r>
+            <a:r>
+              <a:rPr lang="en-US" dirty="0" err="1" smtClean="0"/>
+              <a:t>bước</a:t>
+            </a:r>
+            <a:r>
+              <a:rPr lang="en-US" dirty="0" smtClean="0"/>
+              <a:t>.</a:t>
+            </a:r>
+          </a:p>
+          <a:p>
+            <a:r>
+              <a:rPr lang="en-US" dirty="0" err="1" smtClean="0"/>
+              <a:t>Dự</a:t>
+            </a:r>
+            <a:r>
+              <a:rPr lang="en-US" dirty="0" smtClean="0"/>
+              <a:t> </a:t>
+            </a:r>
+            <a:r>
+              <a:rPr lang="en-US" dirty="0" err="1" smtClean="0"/>
+              <a:t>định</a:t>
+            </a:r>
+            <a:r>
+              <a:rPr lang="en-US" dirty="0" smtClean="0"/>
+              <a:t> </a:t>
+            </a:r>
+            <a:r>
+              <a:rPr lang="en-US" dirty="0" err="1" smtClean="0"/>
+              <a:t>tạo</a:t>
+            </a:r>
+            <a:r>
+              <a:rPr lang="en-US" dirty="0" smtClean="0"/>
+              <a:t> </a:t>
+            </a:r>
+            <a:r>
+              <a:rPr lang="en-US" dirty="0" err="1" smtClean="0"/>
+              <a:t>một</a:t>
+            </a:r>
+            <a:r>
+              <a:rPr lang="en-US" dirty="0" smtClean="0"/>
+              <a:t> </a:t>
+            </a:r>
+            <a:r>
+              <a:rPr lang="en-US" dirty="0" err="1" smtClean="0"/>
+              <a:t>bảng</a:t>
+            </a:r>
+            <a:r>
+              <a:rPr lang="en-US" dirty="0" smtClean="0"/>
+              <a:t> </a:t>
+            </a:r>
+            <a:r>
+              <a:rPr lang="en-US" dirty="0" err="1" smtClean="0"/>
+              <a:t>trong</a:t>
+            </a:r>
+            <a:r>
+              <a:rPr lang="en-US" dirty="0" smtClean="0"/>
+              <a:t> CSDL </a:t>
+            </a:r>
+            <a:r>
+              <a:rPr lang="en-US" dirty="0" err="1" smtClean="0"/>
+              <a:t>để</a:t>
+            </a:r>
+            <a:r>
+              <a:rPr lang="en-US" dirty="0" smtClean="0"/>
+              <a:t> </a:t>
+            </a:r>
+            <a:r>
+              <a:rPr lang="en-US" dirty="0" err="1" smtClean="0"/>
+              <a:t>lưu</a:t>
+            </a:r>
+            <a:r>
+              <a:rPr lang="en-US" dirty="0" smtClean="0"/>
+              <a:t> </a:t>
+            </a:r>
+            <a:r>
+              <a:rPr lang="en-US" dirty="0" err="1" smtClean="0"/>
+              <a:t>câu</a:t>
+            </a:r>
+            <a:r>
+              <a:rPr lang="en-US" dirty="0" smtClean="0"/>
+              <a:t> </a:t>
+            </a:r>
+            <a:r>
+              <a:rPr lang="en-US" dirty="0" err="1" smtClean="0"/>
+              <a:t>hỏi</a:t>
+            </a:r>
+            <a:r>
+              <a:rPr lang="en-US" dirty="0" smtClean="0"/>
+              <a:t> </a:t>
+            </a:r>
+            <a:r>
+              <a:rPr lang="en-US" dirty="0" err="1" smtClean="0"/>
+              <a:t>và</a:t>
+            </a:r>
+            <a:r>
+              <a:rPr lang="en-US" dirty="0" smtClean="0"/>
+              <a:t> </a:t>
+            </a:r>
+            <a:r>
+              <a:rPr lang="en-US" dirty="0" err="1" smtClean="0"/>
+              <a:t>câu</a:t>
+            </a:r>
+            <a:r>
+              <a:rPr lang="en-US" dirty="0" smtClean="0"/>
+              <a:t> </a:t>
+            </a:r>
+            <a:r>
+              <a:rPr lang="en-US" dirty="0" err="1" smtClean="0"/>
+              <a:t>truy</a:t>
+            </a:r>
+            <a:r>
+              <a:rPr lang="en-US" dirty="0" smtClean="0"/>
+              <a:t> </a:t>
+            </a:r>
+            <a:r>
+              <a:rPr lang="en-US" dirty="0" err="1" smtClean="0"/>
+              <a:t>vấn</a:t>
+            </a:r>
+            <a:r>
+              <a:rPr lang="en-US" dirty="0" smtClean="0"/>
+              <a:t> </a:t>
+            </a:r>
+            <a:r>
+              <a:rPr lang="en-US" dirty="0" err="1" smtClean="0"/>
+              <a:t>của</a:t>
+            </a:r>
+            <a:r>
+              <a:rPr lang="en-US" dirty="0" smtClean="0"/>
+              <a:t> </a:t>
+            </a:r>
+            <a:r>
+              <a:rPr lang="en-US" dirty="0" err="1" smtClean="0"/>
+              <a:t>người</a:t>
+            </a:r>
+            <a:r>
+              <a:rPr lang="en-US" dirty="0" smtClean="0"/>
+              <a:t> </a:t>
+            </a:r>
+            <a:r>
+              <a:rPr lang="en-US" dirty="0" err="1" smtClean="0"/>
+              <a:t>dùng</a:t>
+            </a:r>
+            <a:r>
+              <a:rPr lang="en-US" dirty="0" smtClean="0"/>
+              <a:t>.</a:t>
+            </a:r>
+          </a:p>
+          <a:p>
+            <a:endParaRPr lang="en-US" dirty="0"/>
+          </a:p>
+        </p:txBody>
+      </p:sp>
+    </p:spTree>
+  </p:cSld>
+  <p:clrMapOvr>
+    <a:masterClrMapping/>
+  </p:clrMapOvr>
+</p:sld>
+</file>
+
+<file path=ppt/slides/slide16.xml><?xml version="1.0" encoding="utf-8"?>
+<p:sld xmlns:a="http://schemas.openxmlformats.org/drawingml/2006/main" xmlns:r="http://schemas.openxmlformats.org/officeDocument/2006/relationships" xmlns:p="http://schemas.openxmlformats.org/presentationml/2006/main">
+  <p:cSld>
+    <p:spTree>
+      <p:nvGrpSpPr>
+        <p:cNvPr id="1" name=""/>
+        <p:cNvGrpSpPr/>
+        <p:nvPr/>
+      </p:nvGrpSpPr>
+      <p:grpSpPr>
+        <a:xfrm>
+          <a:off x="0" y="0"/>
+          <a:ext cx="0" cy="0"/>
+          <a:chOff x="0" y="0"/>
+          <a:chExt cx="0" cy="0"/>
+        </a:xfrm>
+      </p:grpSpPr>
+      <p:sp>
+        <p:nvSpPr>
+          <p:cNvPr id="2" name="Title 1"/>
+          <p:cNvSpPr>
+            <a:spLocks noGrp="1"/>
+          </p:cNvSpPr>
+          <p:nvPr>
+            <p:ph type="title"/>
+          </p:nvPr>
+        </p:nvSpPr>
+        <p:spPr/>
+        <p:txBody>
+          <a:bodyPr/>
+          <a:lstStyle/>
+          <a:p>
+            <a:r>
               <a:rPr lang="en-US" dirty="0" err="1" smtClean="0"/>
               <a:t>Các</a:t>
             </a:r>
@@ -6260,19 +6530,85 @@
           <a:p>
             <a:r>
               <a:rPr lang="en-US" sz="2400" dirty="0" smtClean="0"/>
-              <a:t>[8] </a:t>
-            </a:r>
+              <a:t>[1] </a:t>
+            </a:r>
+            <a:r>
+              <a:rPr lang="en-US" sz="2400" dirty="0" smtClean="0">
+                <a:hlinkClick r:id="rId2"/>
+              </a:rPr>
+              <a:t>http://www.informatik.uni-trier.de/~ley/db/</a:t>
+            </a:r>
+            <a:endParaRPr lang="en-US" sz="2400" dirty="0" smtClean="0"/>
+          </a:p>
+          <a:p>
             <a:r>
               <a:rPr lang="en-US" sz="2400" dirty="0" smtClean="0"/>
-              <a:t> </a:t>
-            </a:r>
+              <a:t>[2] </a:t>
+            </a:r>
+            <a:r>
+              <a:rPr lang="en-US" sz="2400" u="sng" dirty="0" smtClean="0">
+                <a:hlinkClick r:id="rId3"/>
+              </a:rPr>
+              <a:t>http://en.wikipedia.org/wiki/Question#Types</a:t>
+            </a:r>
+            <a:endParaRPr lang="en-US" sz="2400" dirty="0" smtClean="0"/>
+          </a:p>
+          <a:p>
             <a:r>
               <a:rPr lang="en-US" sz="2400" dirty="0" smtClean="0"/>
-              <a:t>“</a:t>
+              <a:t>[3] </a:t>
+            </a:r>
+            <a:r>
+              <a:rPr lang="en-US" sz="2400" u="sng" dirty="0" smtClean="0">
+                <a:hlinkClick r:id="rId4"/>
+              </a:rPr>
+              <a:t>http://www.englishclub.com/grammar/verbs-questions_types.htm</a:t>
+            </a:r>
+            <a:r>
+              <a:rPr lang="en-US" sz="2400" dirty="0" smtClean="0"/>
+              <a:t> </a:t>
+            </a:r>
+          </a:p>
+          <a:p>
+            <a:r>
+              <a:rPr lang="en-US" sz="2400" dirty="0" smtClean="0"/>
+              <a:t>[4] </a:t>
+            </a:r>
+            <a:r>
+              <a:rPr lang="en-US" sz="2400" u="sng" dirty="0" smtClean="0">
+                <a:hlinkClick r:id="rId5"/>
+              </a:rPr>
+              <a:t>http://oxforddictionaries.com/view/entry/m_en_gb0680290#m_en_gb0680290</a:t>
+            </a:r>
+            <a:r>
+              <a:rPr lang="en-US" sz="2400" dirty="0" smtClean="0"/>
+              <a:t> </a:t>
+            </a:r>
+          </a:p>
+          <a:p>
+            <a:r>
+              <a:rPr lang="en-US" sz="2400" dirty="0" smtClean="0"/>
+              <a:t>[5] </a:t>
+            </a:r>
+            <a:r>
+              <a:rPr lang="en-US" sz="2400" u="sng" dirty="0" smtClean="0">
+                <a:hlinkClick r:id="rId6"/>
+              </a:rPr>
+              <a:t>http://www.learnenglish.de/grammar/questiontext.htm</a:t>
+            </a:r>
+            <a:r>
+              <a:rPr lang="en-US" sz="2400" dirty="0" smtClean="0"/>
+              <a:t> </a:t>
+            </a:r>
+          </a:p>
+          <a:p>
+            <a:r>
+              <a:rPr lang="en-US" sz="2400" dirty="0" smtClean="0"/>
+              <a:t>[6] “A Question Answering System based on Conceptual Graph Formalism”, </a:t>
             </a:r>
             <a:r>
               <a:rPr lang="en-US" sz="2400" dirty="0" err="1" smtClean="0"/>
-              <a:t>Xây</a:t>
+              <a:t>Wael</a:t>
             </a:r>
             <a:r>
               <a:rPr lang="en-US" sz="2400" dirty="0" smtClean="0"/>
@@ -6280,15 +6616,21 @@
             </a:r>
             <a:r>
               <a:rPr lang="en-US" sz="2400" dirty="0" err="1" smtClean="0"/>
-              <a:t>dựng</a:t>
+              <a:t>Salloum</a:t>
             </a:r>
             <a:r>
               <a:rPr lang="en-US" sz="2400" dirty="0" smtClean="0"/>
-              <a:t> </a:t>
+              <a:t> , 2009.</a:t>
+            </a:r>
+          </a:p>
+          <a:p>
+            <a:r>
+              <a:rPr lang="en-US" sz="2400" dirty="0" smtClean="0"/>
+              <a:t>[7] “ </a:t>
             </a:r>
             <a:r>
               <a:rPr lang="en-US" sz="2400" dirty="0" err="1" smtClean="0"/>
-              <a:t>công</a:t>
+              <a:t>Dịch</a:t>
             </a:r>
             <a:r>
               <a:rPr lang="en-US" sz="2400" dirty="0" smtClean="0"/>
@@ -6296,71 +6638,7 @@
             </a:r>
             <a:r>
               <a:rPr lang="en-US" sz="2400" dirty="0" err="1" smtClean="0"/>
-              <a:t>cụ</a:t>
-            </a:r>
-            <a:r>
-              <a:rPr lang="en-US" sz="2400" dirty="0" smtClean="0"/>
-              <a:t> </a:t>
-            </a:r>
-            <a:r>
-              <a:rPr lang="en-US" sz="2400" dirty="0" err="1" smtClean="0"/>
-              <a:t>tìm</a:t>
-            </a:r>
-            <a:r>
-              <a:rPr lang="en-US" sz="2400" dirty="0" smtClean="0"/>
-              <a:t> </a:t>
-            </a:r>
-            <a:r>
-              <a:rPr lang="en-US" sz="2400" dirty="0" err="1" smtClean="0"/>
-              <a:t>kiếm</a:t>
-            </a:r>
-            <a:r>
-              <a:rPr lang="en-US" sz="2400" dirty="0" smtClean="0"/>
-              <a:t> </a:t>
-            </a:r>
-            <a:r>
-              <a:rPr lang="en-US" sz="2400" dirty="0" err="1" smtClean="0"/>
-              <a:t>tài</a:t>
-            </a:r>
-            <a:r>
-              <a:rPr lang="en-US" sz="2400" dirty="0" smtClean="0"/>
-              <a:t> </a:t>
-            </a:r>
-            <a:r>
-              <a:rPr lang="en-US" sz="2400" dirty="0" err="1" smtClean="0"/>
-              <a:t>liệu</a:t>
-            </a:r>
-            <a:r>
-              <a:rPr lang="en-US" sz="2400" dirty="0" smtClean="0"/>
-              <a:t> </a:t>
-            </a:r>
-            <a:r>
-              <a:rPr lang="en-US" sz="2400" dirty="0" err="1" smtClean="0"/>
-              <a:t>học</a:t>
-            </a:r>
-            <a:r>
-              <a:rPr lang="en-US" sz="2400" dirty="0" smtClean="0"/>
-              <a:t> </a:t>
-            </a:r>
-            <a:r>
-              <a:rPr lang="en-US" sz="2400" dirty="0" err="1" smtClean="0"/>
-              <a:t>tập</a:t>
-            </a:r>
-            <a:r>
-              <a:rPr lang="en-US" sz="2400" dirty="0" smtClean="0"/>
-              <a:t> </a:t>
-            </a:r>
-            <a:r>
-              <a:rPr lang="en-US" sz="2400" dirty="0" err="1" smtClean="0"/>
-              <a:t>bằng</a:t>
-            </a:r>
-            <a:r>
-              <a:rPr lang="en-US" sz="2400" dirty="0" smtClean="0"/>
-              <a:t> </a:t>
-            </a:r>
-            <a:r>
-              <a:rPr lang="en-US" sz="2400" dirty="0" err="1" smtClean="0"/>
-              <a:t>các</a:t>
+              <a:t>câu</a:t>
             </a:r>
             <a:r>
               <a:rPr lang="en-US" sz="2400" dirty="0" smtClean="0"/>
@@ -6384,7 +6662,7 @@
             </a:r>
             <a:r>
               <a:rPr lang="en-US" sz="2400" dirty="0" err="1" smtClean="0"/>
-              <a:t>ngôn</a:t>
+              <a:t>có</a:t>
             </a:r>
             <a:r>
               <a:rPr lang="en-US" sz="2400" dirty="0" smtClean="0"/>
@@ -6392,7 +6670,7 @@
             </a:r>
             <a:r>
               <a:rPr lang="en-US" sz="2400" dirty="0" err="1" smtClean="0"/>
-              <a:t>ngữ</a:t>
+              <a:t>cấu</a:t>
             </a:r>
             <a:r>
               <a:rPr lang="en-US" sz="2400" dirty="0" smtClean="0"/>
@@ -6400,39 +6678,39 @@
             </a:r>
             <a:r>
               <a:rPr lang="en-US" sz="2400" dirty="0" err="1" smtClean="0"/>
-              <a:t>tự</a:t>
+              <a:t>trúc</a:t>
             </a:r>
             <a:r>
               <a:rPr lang="en-US" sz="2400" dirty="0" smtClean="0"/>
-              <a:t> </a:t>
+              <a:t> sang </a:t>
             </a:r>
             <a:r>
               <a:rPr lang="en-US" sz="2400" dirty="0" err="1" smtClean="0"/>
-              <a:t>nhiên</a:t>
+              <a:t>đồ</a:t>
             </a:r>
             <a:r>
               <a:rPr lang="en-US" sz="2400" dirty="0" smtClean="0"/>
-              <a:t>  </a:t>
+              <a:t> </a:t>
             </a:r>
             <a:r>
               <a:rPr lang="en-US" sz="2400" dirty="0" err="1" smtClean="0"/>
-              <a:t>trên</a:t>
+              <a:t>thị</a:t>
             </a:r>
             <a:r>
               <a:rPr lang="en-US" sz="2400" dirty="0" smtClean="0"/>
-              <a:t> </a:t>
+              <a:t> ý </a:t>
             </a:r>
             <a:r>
               <a:rPr lang="en-US" sz="2400" dirty="0" err="1" smtClean="0"/>
-              <a:t>kho</a:t>
+              <a:t>niệm</a:t>
             </a:r>
             <a:r>
               <a:rPr lang="en-US" sz="2400" dirty="0" smtClean="0"/>
-              <a:t> </a:t>
+              <a:t>: </a:t>
             </a:r>
             <a:r>
               <a:rPr lang="en-US" sz="2400" dirty="0" err="1" smtClean="0"/>
-              <a:t>học</a:t>
+              <a:t>cách</a:t>
             </a:r>
             <a:r>
               <a:rPr lang="en-US" sz="2400" dirty="0" smtClean="0"/>
@@ -6440,7 +6718,7 @@
             </a:r>
             <a:r>
               <a:rPr lang="en-US" sz="2400" dirty="0" err="1" smtClean="0"/>
-              <a:t>liệu</a:t>
+              <a:t>tiếp</a:t>
             </a:r>
             <a:r>
               <a:rPr lang="en-US" sz="2400" dirty="0" smtClean="0"/>
@@ -6448,7 +6726,7 @@
             </a:r>
             <a:r>
               <a:rPr lang="en-US" sz="2400" dirty="0" err="1" smtClean="0"/>
-              <a:t>mở</a:t>
+              <a:t>cận</a:t>
             </a:r>
             <a:r>
               <a:rPr lang="en-US" sz="2400" dirty="0" smtClean="0"/>
@@ -6456,7 +6734,7 @@
             </a:r>
             <a:r>
               <a:rPr lang="en-US" sz="2400" dirty="0" err="1" smtClean="0"/>
-              <a:t>tiếng</a:t>
+              <a:t>ít</a:t>
             </a:r>
             <a:r>
               <a:rPr lang="en-US" sz="2400" dirty="0" smtClean="0"/>
@@ -6464,15 +6742,15 @@
             </a:r>
             <a:r>
               <a:rPr lang="en-US" sz="2400" dirty="0" err="1" smtClean="0"/>
-              <a:t>Việt</a:t>
+              <a:t>phụ</a:t>
             </a:r>
             <a:r>
               <a:rPr lang="en-US" sz="2400" dirty="0" smtClean="0"/>
-              <a:t>”, </a:t>
+              <a:t> </a:t>
             </a:r>
             <a:r>
               <a:rPr lang="en-US" sz="2400" dirty="0" err="1" smtClean="0"/>
-              <a:t>Lương</a:t>
+              <a:t>thuộc</a:t>
             </a:r>
             <a:r>
               <a:rPr lang="en-US" sz="2400" dirty="0" smtClean="0"/>
@@ -6480,7 +6758,7 @@
             </a:r>
             <a:r>
               <a:rPr lang="en-US" sz="2400" dirty="0" err="1" smtClean="0"/>
-              <a:t>Quý</a:t>
+              <a:t>vào</a:t>
             </a:r>
             <a:r>
               <a:rPr lang="en-US" sz="2400" dirty="0" smtClean="0"/>
@@ -6488,7 +6766,7 @@
             </a:r>
             <a:r>
               <a:rPr lang="en-US" sz="2400" dirty="0" err="1" smtClean="0"/>
-              <a:t>Tịnh</a:t>
+              <a:t>cú</a:t>
             </a:r>
             <a:r>
               <a:rPr lang="en-US" sz="2400" dirty="0" smtClean="0"/>
@@ -6496,88 +6774,27 @@
             </a:r>
             <a:r>
               <a:rPr lang="en-US" sz="2400" dirty="0" err="1" smtClean="0"/>
-              <a:t>Hà</a:t>
+              <a:t>pháp</a:t>
             </a:r>
             <a:r>
               <a:rPr lang="en-US" sz="2400" dirty="0" smtClean="0"/>
-              <a:t>, 2009.</a:t>
-            </a:r>
-          </a:p>
-          <a:p>
+              <a:t>”, Cao </a:t>
+            </a:r>
+            <a:r>
+              <a:rPr lang="en-US" sz="2400" dirty="0" err="1" smtClean="0"/>
+              <a:t>Duy</a:t>
+            </a:r>
             <a:r>
               <a:rPr lang="en-US" sz="2400" dirty="0" smtClean="0"/>
-              <a:t>[9] “Automatic </a:t>
+              <a:t> </a:t>
+            </a:r>
+            <a:r>
+              <a:rPr lang="en-US" sz="2400" dirty="0" err="1" smtClean="0"/>
+              <a:t>Trường</a:t>
             </a:r>
             <a:r>
               <a:rPr lang="en-US" sz="2400" dirty="0" smtClean="0"/>
-              <a:t>Question Pattern Generation for Ontology-based Question”, </a:t>
-            </a:r>
-            <a:r>
-              <a:rPr lang="en-US" sz="2400" dirty="0" err="1" smtClean="0"/>
-              <a:t>Shiyan</a:t>
-            </a:r>
-            <a:r>
-              <a:rPr lang="en-US" sz="2400" dirty="0" smtClean="0"/>
-              <a:t> </a:t>
-            </a:r>
-            <a:r>
-              <a:rPr lang="en-US" sz="2400" dirty="0" err="1" smtClean="0"/>
-              <a:t>Ou</a:t>
-            </a:r>
-            <a:r>
-              <a:rPr lang="en-US" sz="2400" dirty="0" smtClean="0"/>
-              <a:t>, </a:t>
-            </a:r>
-            <a:r>
-              <a:rPr lang="en-US" sz="2400" dirty="0" err="1" smtClean="0"/>
-              <a:t>Constantin</a:t>
-            </a:r>
-            <a:r>
-              <a:rPr lang="en-US" sz="2400" dirty="0" smtClean="0"/>
-              <a:t> </a:t>
-            </a:r>
-            <a:r>
-              <a:rPr lang="en-US" sz="2400" dirty="0" err="1" smtClean="0"/>
-              <a:t>Orasan</a:t>
-            </a:r>
-            <a:r>
-              <a:rPr lang="en-US" sz="2400" dirty="0" smtClean="0"/>
-              <a:t>, </a:t>
-            </a:r>
-            <a:r>
-              <a:rPr lang="en-US" sz="2400" dirty="0" err="1" smtClean="0"/>
-              <a:t>Dalila</a:t>
-            </a:r>
-            <a:r>
-              <a:rPr lang="en-US" sz="2400" dirty="0" smtClean="0"/>
-              <a:t> </a:t>
-            </a:r>
-            <a:r>
-              <a:rPr lang="en-US" sz="2400" dirty="0" err="1" smtClean="0"/>
-              <a:t>Mekhaldi</a:t>
-            </a:r>
-            <a:r>
-              <a:rPr lang="en-US" sz="2400" dirty="0" smtClean="0"/>
-              <a:t> and Laura </a:t>
-            </a:r>
-            <a:r>
-              <a:rPr lang="en-US" sz="2400" dirty="0" err="1" smtClean="0"/>
-              <a:t>Hasler</a:t>
-            </a:r>
-            <a:r>
-              <a:rPr lang="en-US" sz="2400" dirty="0" smtClean="0"/>
-              <a:t>, 2008</a:t>
-            </a:r>
-            <a:endParaRPr lang="en-US" sz="2400" dirty="0" smtClean="0"/>
-          </a:p>
-          <a:p>
-            <a:r>
-              <a:rPr lang="en-US" sz="2400" dirty="0" smtClean="0"/>
-              <a:t>[10] Learning </a:t>
-            </a:r>
-            <a:r>
-              <a:rPr lang="en-US" sz="2400" dirty="0" smtClean="0"/>
-              <a:t>Question Classifier, Li and Roth, 2002</a:t>
+              <a:t>, 2008.</a:t>
             </a:r>
           </a:p>
           <a:p>
@@ -6596,7 +6813,420 @@
 </p:sld>
 </file>
 
-<file path=ppt/slides/slide15.xml><?xml version="1.0" encoding="utf-8"?>
+<file path=ppt/slides/slide17.xml><?xml version="1.0" encoding="utf-8"?>
+<p:sld xmlns:a="http://schemas.openxmlformats.org/drawingml/2006/main" xmlns:r="http://schemas.openxmlformats.org/officeDocument/2006/relationships" xmlns:p="http://schemas.openxmlformats.org/presentationml/2006/main">
+  <p:cSld>
+    <p:spTree>
+      <p:nvGrpSpPr>
+        <p:cNvPr id="1" name=""/>
+        <p:cNvGrpSpPr/>
+        <p:nvPr/>
+      </p:nvGrpSpPr>
+      <p:grpSpPr>
+        <a:xfrm>
+          <a:off x="0" y="0"/>
+          <a:ext cx="0" cy="0"/>
+          <a:chOff x="0" y="0"/>
+          <a:chExt cx="0" cy="0"/>
+        </a:xfrm>
+      </p:grpSpPr>
+      <p:sp>
+        <p:nvSpPr>
+          <p:cNvPr id="2" name="Title 1"/>
+          <p:cNvSpPr>
+            <a:spLocks noGrp="1"/>
+          </p:cNvSpPr>
+          <p:nvPr>
+            <p:ph type="title"/>
+          </p:nvPr>
+        </p:nvSpPr>
+        <p:spPr/>
+        <p:txBody>
+          <a:bodyPr/>
+          <a:lstStyle/>
+          <a:p>
+            <a:r>
+              <a:rPr lang="en-US" dirty="0" err="1" smtClean="0"/>
+              <a:t>Các</a:t>
+            </a:r>
+            <a:r>
+              <a:rPr lang="en-US" dirty="0" smtClean="0"/>
+              <a:t> </a:t>
+            </a:r>
+            <a:r>
+              <a:rPr lang="en-US" dirty="0" err="1" smtClean="0"/>
+              <a:t>tài</a:t>
+            </a:r>
+            <a:r>
+              <a:rPr lang="en-US" dirty="0" smtClean="0"/>
+              <a:t> </a:t>
+            </a:r>
+            <a:r>
+              <a:rPr lang="en-US" dirty="0" err="1" smtClean="0"/>
+              <a:t>liệu</a:t>
+            </a:r>
+            <a:r>
+              <a:rPr lang="en-US" dirty="0" smtClean="0"/>
+              <a:t> </a:t>
+            </a:r>
+            <a:r>
+              <a:rPr lang="en-US" dirty="0" err="1" smtClean="0"/>
+              <a:t>tham</a:t>
+            </a:r>
+            <a:r>
+              <a:rPr lang="en-US" dirty="0" smtClean="0"/>
+              <a:t> </a:t>
+            </a:r>
+            <a:r>
+              <a:rPr lang="en-US" dirty="0" err="1" smtClean="0"/>
+              <a:t>khảo</a:t>
+            </a:r>
+            <a:endParaRPr lang="en-US" dirty="0"/>
+          </a:p>
+        </p:txBody>
+      </p:sp>
+      <p:sp>
+        <p:nvSpPr>
+          <p:cNvPr id="3" name="Content Placeholder 2"/>
+          <p:cNvSpPr>
+            <a:spLocks noGrp="1"/>
+          </p:cNvSpPr>
+          <p:nvPr>
+            <p:ph idx="1"/>
+          </p:nvPr>
+        </p:nvSpPr>
+        <p:spPr>
+          <a:xfrm>
+            <a:off x="457200" y="1219200"/>
+            <a:ext cx="8534400" cy="5181600"/>
+          </a:xfrm>
+        </p:spPr>
+        <p:txBody>
+          <a:bodyPr/>
+          <a:lstStyle/>
+          <a:p>
+            <a:r>
+              <a:rPr lang="en-US" sz="2400" dirty="0" smtClean="0"/>
+              <a:t>[8]  “</a:t>
+            </a:r>
+            <a:r>
+              <a:rPr lang="en-US" sz="2400" dirty="0" err="1" smtClean="0"/>
+              <a:t>Xây</a:t>
+            </a:r>
+            <a:r>
+              <a:rPr lang="en-US" sz="2400" dirty="0" smtClean="0"/>
+              <a:t> </a:t>
+            </a:r>
+            <a:r>
+              <a:rPr lang="en-US" sz="2400" dirty="0" err="1" smtClean="0"/>
+              <a:t>dựng</a:t>
+            </a:r>
+            <a:r>
+              <a:rPr lang="en-US" sz="2400" dirty="0" smtClean="0"/>
+              <a:t> </a:t>
+            </a:r>
+            <a:r>
+              <a:rPr lang="en-US" sz="2400" dirty="0" err="1" smtClean="0"/>
+              <a:t>công</a:t>
+            </a:r>
+            <a:r>
+              <a:rPr lang="en-US" sz="2400" dirty="0" smtClean="0"/>
+              <a:t> </a:t>
+            </a:r>
+            <a:r>
+              <a:rPr lang="en-US" sz="2400" dirty="0" err="1" smtClean="0"/>
+              <a:t>cụ</a:t>
+            </a:r>
+            <a:r>
+              <a:rPr lang="en-US" sz="2400" dirty="0" smtClean="0"/>
+              <a:t> </a:t>
+            </a:r>
+            <a:r>
+              <a:rPr lang="en-US" sz="2400" dirty="0" err="1" smtClean="0"/>
+              <a:t>tìm</a:t>
+            </a:r>
+            <a:r>
+              <a:rPr lang="en-US" sz="2400" dirty="0" smtClean="0"/>
+              <a:t> </a:t>
+            </a:r>
+            <a:r>
+              <a:rPr lang="en-US" sz="2400" dirty="0" err="1" smtClean="0"/>
+              <a:t>kiếm</a:t>
+            </a:r>
+            <a:r>
+              <a:rPr lang="en-US" sz="2400" dirty="0" smtClean="0"/>
+              <a:t> </a:t>
+            </a:r>
+            <a:r>
+              <a:rPr lang="en-US" sz="2400" dirty="0" err="1" smtClean="0"/>
+              <a:t>tài</a:t>
+            </a:r>
+            <a:r>
+              <a:rPr lang="en-US" sz="2400" dirty="0" smtClean="0"/>
+              <a:t> </a:t>
+            </a:r>
+            <a:r>
+              <a:rPr lang="en-US" sz="2400" dirty="0" err="1" smtClean="0"/>
+              <a:t>liệu</a:t>
+            </a:r>
+            <a:r>
+              <a:rPr lang="en-US" sz="2400" dirty="0" smtClean="0"/>
+              <a:t> </a:t>
+            </a:r>
+            <a:r>
+              <a:rPr lang="en-US" sz="2400" dirty="0" err="1" smtClean="0"/>
+              <a:t>học</a:t>
+            </a:r>
+            <a:r>
+              <a:rPr lang="en-US" sz="2400" dirty="0" smtClean="0"/>
+              <a:t> </a:t>
+            </a:r>
+            <a:r>
+              <a:rPr lang="en-US" sz="2400" dirty="0" err="1" smtClean="0"/>
+              <a:t>tập</a:t>
+            </a:r>
+            <a:r>
+              <a:rPr lang="en-US" sz="2400" dirty="0" smtClean="0"/>
+              <a:t> </a:t>
+            </a:r>
+            <a:r>
+              <a:rPr lang="en-US" sz="2400" dirty="0" err="1" smtClean="0"/>
+              <a:t>bằng</a:t>
+            </a:r>
+            <a:r>
+              <a:rPr lang="en-US" sz="2400" dirty="0" smtClean="0"/>
+              <a:t> </a:t>
+            </a:r>
+            <a:r>
+              <a:rPr lang="en-US" sz="2400" dirty="0" err="1" smtClean="0"/>
+              <a:t>các</a:t>
+            </a:r>
+            <a:r>
+              <a:rPr lang="en-US" sz="2400" dirty="0" smtClean="0"/>
+              <a:t> </a:t>
+            </a:r>
+            <a:r>
+              <a:rPr lang="en-US" sz="2400" dirty="0" err="1" smtClean="0"/>
+              <a:t>truy</a:t>
+            </a:r>
+            <a:r>
+              <a:rPr lang="en-US" sz="2400" dirty="0" smtClean="0"/>
+              <a:t> </a:t>
+            </a:r>
+            <a:r>
+              <a:rPr lang="en-US" sz="2400" dirty="0" err="1" smtClean="0"/>
+              <a:t>vấn</a:t>
+            </a:r>
+            <a:r>
+              <a:rPr lang="en-US" sz="2400" dirty="0" smtClean="0"/>
+              <a:t> </a:t>
+            </a:r>
+            <a:r>
+              <a:rPr lang="en-US" sz="2400" dirty="0" err="1" smtClean="0"/>
+              <a:t>ngôn</a:t>
+            </a:r>
+            <a:r>
+              <a:rPr lang="en-US" sz="2400" dirty="0" smtClean="0"/>
+              <a:t> </a:t>
+            </a:r>
+            <a:r>
+              <a:rPr lang="en-US" sz="2400" dirty="0" err="1" smtClean="0"/>
+              <a:t>ngữ</a:t>
+            </a:r>
+            <a:r>
+              <a:rPr lang="en-US" sz="2400" dirty="0" smtClean="0"/>
+              <a:t> </a:t>
+            </a:r>
+            <a:r>
+              <a:rPr lang="en-US" sz="2400" dirty="0" err="1" smtClean="0"/>
+              <a:t>tự</a:t>
+            </a:r>
+            <a:r>
+              <a:rPr lang="en-US" sz="2400" dirty="0" smtClean="0"/>
+              <a:t> </a:t>
+            </a:r>
+            <a:r>
+              <a:rPr lang="en-US" sz="2400" dirty="0" err="1" smtClean="0"/>
+              <a:t>nhiên</a:t>
+            </a:r>
+            <a:r>
+              <a:rPr lang="en-US" sz="2400" dirty="0" smtClean="0"/>
+              <a:t>  </a:t>
+            </a:r>
+            <a:r>
+              <a:rPr lang="en-US" sz="2400" dirty="0" err="1" smtClean="0"/>
+              <a:t>trên</a:t>
+            </a:r>
+            <a:r>
+              <a:rPr lang="en-US" sz="2400" dirty="0" smtClean="0"/>
+              <a:t> </a:t>
+            </a:r>
+            <a:r>
+              <a:rPr lang="en-US" sz="2400" dirty="0" err="1" smtClean="0"/>
+              <a:t>kho</a:t>
+            </a:r>
+            <a:r>
+              <a:rPr lang="en-US" sz="2400" dirty="0" smtClean="0"/>
+              <a:t> </a:t>
+            </a:r>
+            <a:r>
+              <a:rPr lang="en-US" sz="2400" dirty="0" err="1" smtClean="0"/>
+              <a:t>học</a:t>
+            </a:r>
+            <a:r>
+              <a:rPr lang="en-US" sz="2400" dirty="0" smtClean="0"/>
+              <a:t> </a:t>
+            </a:r>
+            <a:r>
+              <a:rPr lang="en-US" sz="2400" dirty="0" err="1" smtClean="0"/>
+              <a:t>liệu</a:t>
+            </a:r>
+            <a:r>
+              <a:rPr lang="en-US" sz="2400" dirty="0" smtClean="0"/>
+              <a:t> </a:t>
+            </a:r>
+            <a:r>
+              <a:rPr lang="en-US" sz="2400" dirty="0" err="1" smtClean="0"/>
+              <a:t>mở</a:t>
+            </a:r>
+            <a:r>
+              <a:rPr lang="en-US" sz="2400" dirty="0" smtClean="0"/>
+              <a:t> </a:t>
+            </a:r>
+            <a:r>
+              <a:rPr lang="en-US" sz="2400" dirty="0" err="1" smtClean="0"/>
+              <a:t>tiếng</a:t>
+            </a:r>
+            <a:r>
+              <a:rPr lang="en-US" sz="2400" dirty="0" smtClean="0"/>
+              <a:t> </a:t>
+            </a:r>
+            <a:r>
+              <a:rPr lang="en-US" sz="2400" dirty="0" err="1" smtClean="0"/>
+              <a:t>Việt</a:t>
+            </a:r>
+            <a:r>
+              <a:rPr lang="en-US" sz="2400" dirty="0" smtClean="0"/>
+              <a:t>”, </a:t>
+            </a:r>
+            <a:r>
+              <a:rPr lang="en-US" sz="2400" dirty="0" err="1" smtClean="0"/>
+              <a:t>Lương</a:t>
+            </a:r>
+            <a:r>
+              <a:rPr lang="en-US" sz="2400" dirty="0" smtClean="0"/>
+              <a:t> </a:t>
+            </a:r>
+            <a:r>
+              <a:rPr lang="en-US" sz="2400" dirty="0" err="1" smtClean="0"/>
+              <a:t>Quý</a:t>
+            </a:r>
+            <a:r>
+              <a:rPr lang="en-US" sz="2400" dirty="0" smtClean="0"/>
+              <a:t> </a:t>
+            </a:r>
+            <a:r>
+              <a:rPr lang="en-US" sz="2400" dirty="0" err="1" smtClean="0"/>
+              <a:t>Tịnh</a:t>
+            </a:r>
+            <a:r>
+              <a:rPr lang="en-US" sz="2400" dirty="0" smtClean="0"/>
+              <a:t> </a:t>
+            </a:r>
+            <a:r>
+              <a:rPr lang="en-US" sz="2400" dirty="0" err="1" smtClean="0"/>
+              <a:t>Hà</a:t>
+            </a:r>
+            <a:r>
+              <a:rPr lang="en-US" sz="2400" dirty="0" smtClean="0"/>
+              <a:t>, 2009.</a:t>
+            </a:r>
+          </a:p>
+          <a:p>
+            <a:r>
+              <a:rPr lang="en-US" sz="2400" dirty="0" smtClean="0"/>
+              <a:t>[9] “Automatic Question Pattern Generation for Ontology-based Question”, </a:t>
+            </a:r>
+            <a:r>
+              <a:rPr lang="en-US" sz="2400" dirty="0" err="1" smtClean="0"/>
+              <a:t>Shiyan</a:t>
+            </a:r>
+            <a:r>
+              <a:rPr lang="en-US" sz="2400" dirty="0" smtClean="0"/>
+              <a:t> </a:t>
+            </a:r>
+            <a:r>
+              <a:rPr lang="en-US" sz="2400" dirty="0" err="1" smtClean="0"/>
+              <a:t>Ou</a:t>
+            </a:r>
+            <a:r>
+              <a:rPr lang="en-US" sz="2400" dirty="0" smtClean="0"/>
+              <a:t>, </a:t>
+            </a:r>
+            <a:r>
+              <a:rPr lang="en-US" sz="2400" dirty="0" err="1" smtClean="0"/>
+              <a:t>Constantin</a:t>
+            </a:r>
+            <a:r>
+              <a:rPr lang="en-US" sz="2400" dirty="0" smtClean="0"/>
+              <a:t> </a:t>
+            </a:r>
+            <a:r>
+              <a:rPr lang="en-US" sz="2400" dirty="0" err="1" smtClean="0"/>
+              <a:t>Orasan</a:t>
+            </a:r>
+            <a:r>
+              <a:rPr lang="en-US" sz="2400" dirty="0" smtClean="0"/>
+              <a:t>, </a:t>
+            </a:r>
+            <a:r>
+              <a:rPr lang="en-US" sz="2400" dirty="0" err="1" smtClean="0"/>
+              <a:t>Dalila</a:t>
+            </a:r>
+            <a:r>
+              <a:rPr lang="en-US" sz="2400" dirty="0" smtClean="0"/>
+              <a:t> </a:t>
+            </a:r>
+            <a:r>
+              <a:rPr lang="en-US" sz="2400" dirty="0" err="1" smtClean="0"/>
+              <a:t>Mekhaldi</a:t>
+            </a:r>
+            <a:r>
+              <a:rPr lang="en-US" sz="2400" dirty="0" smtClean="0"/>
+              <a:t> and Laura </a:t>
+            </a:r>
+            <a:r>
+              <a:rPr lang="en-US" sz="2400" dirty="0" err="1" smtClean="0"/>
+              <a:t>Hasler</a:t>
+            </a:r>
+            <a:r>
+              <a:rPr lang="en-US" sz="2400" dirty="0" smtClean="0"/>
+              <a:t>, 2008</a:t>
+            </a:r>
+          </a:p>
+          <a:p>
+            <a:r>
+              <a:rPr lang="en-US" sz="2400" dirty="0" smtClean="0"/>
+              <a:t>[10] Learning Question Classifier, Li and Roth, 2002</a:t>
+            </a:r>
+          </a:p>
+          <a:p>
+            <a:endParaRPr lang="en-US" sz="2400" dirty="0" smtClean="0"/>
+          </a:p>
+          <a:p>
+            <a:endParaRPr lang="en-US" dirty="0"/>
+          </a:p>
+        </p:txBody>
+      </p:sp>
+    </p:spTree>
+  </p:cSld>
+  <p:clrMapOvr>
+    <a:masterClrMapping/>
+  </p:clrMapOvr>
+</p:sld>
+</file>
+
+<file path=ppt/slides/slide18.xml><?xml version="1.0" encoding="utf-8"?>
 <p:sld xmlns:a="http://schemas.openxmlformats.org/drawingml/2006/main" xmlns:r="http://schemas.openxmlformats.org/officeDocument/2006/relationships" xmlns:p="http://schemas.openxmlformats.org/presentationml/2006/main">
   <p:cSld>
     <p:spTree>
@@ -10051,15 +10681,7 @@
             </a:r>
             <a:r>
               <a:rPr lang="en-US" dirty="0" smtClean="0"/>
-              <a:t> : Yes/No Question, Question </a:t>
-            </a:r>
-            <a:r>
-              <a:rPr lang="en-US" dirty="0" smtClean="0"/>
-              <a:t>-word </a:t>
-            </a:r>
-            <a:r>
-              <a:rPr lang="en-US" dirty="0" smtClean="0"/>
-              <a:t>Question </a:t>
+              <a:t> : Yes/No Question, Question -word Question </a:t>
             </a:r>
             <a:r>
               <a:rPr lang="en-US" dirty="0" err="1" smtClean="0"/>
@@ -10103,11 +10725,7 @@
             </a:r>
             <a:r>
               <a:rPr lang="fr-FR" dirty="0" smtClean="0"/>
-              <a:t> question, direct/ indirect question </a:t>
-            </a:r>
-            <a:r>
-              <a:rPr lang="fr-FR" dirty="0" smtClean="0"/>
-              <a:t>[2-5]</a:t>
+              <a:t> question, direct/ indirect question [2-5]</a:t>
             </a:r>
             <a:r>
               <a:rPr lang="fr-FR" b="1" dirty="0" smtClean="0"/>
@@ -10117,7 +10735,6 @@
               <a:rPr lang="fr-FR" dirty="0" smtClean="0"/>
               <a:t> </a:t>
             </a:r>
-            <a:endParaRPr lang="fr-FR" dirty="0" smtClean="0"/>
           </a:p>
           <a:p>
             <a:pPr lvl="1"/>
@@ -10287,11 +10904,7 @@
             </a:r>
             <a:r>
               <a:rPr lang="fr-FR" dirty="0" smtClean="0"/>
-              <a:t> Roth (2002</a:t>
-            </a:r>
-            <a:r>
-              <a:rPr lang="fr-FR" dirty="0" smtClean="0"/>
-              <a:t>) [10]</a:t>
+              <a:t> Roth (2002) [10]</a:t>
             </a:r>
             <a:endParaRPr lang="en-US" dirty="0" smtClean="0"/>
           </a:p>
@@ -10408,7 +11021,7 @@
         </p:nvGraphicFramePr>
         <p:xfrm>
           <a:off x="304800" y="1905000"/>
-          <a:ext cx="8686803" cy="3108960"/>
+          <a:ext cx="8686803" cy="3383280"/>
         </p:xfrm>
         <a:graphic>
           <a:graphicData uri="http://schemas.openxmlformats.org/drawingml/2006/table">
@@ -10594,7 +11207,51 @@
                     <a:bodyPr/>
                     <a:lstStyle/>
                     <a:p>
-                      <a:endParaRPr lang="en-US" dirty="0"/>
+                      <a:pPr marL="0" marR="0" indent="0" algn="l" defTabSz="914400" rtl="0" eaLnBrk="1" fontAlgn="auto" latinLnBrk="0" hangingPunct="1">
+                        <a:lnSpc>
+                          <a:spcPct val="100000"/>
+                        </a:lnSpc>
+                        <a:spcBef>
+                          <a:spcPts val="0"/>
+                        </a:spcBef>
+                        <a:spcAft>
+                          <a:spcPts val="0"/>
+                        </a:spcAft>
+                        <a:buClrTx/>
+                        <a:buSzTx/>
+                        <a:buFontTx/>
+                        <a:buNone/>
+                        <a:tabLst/>
+                        <a:defRPr/>
+                      </a:pPr>
+                      <a:r>
+                        <a:rPr lang="en-US" i="1" dirty="0" smtClean="0"/>
+                        <a:t>Are they good jobs?</a:t>
+                      </a:r>
+                    </a:p>
+                    <a:p>
+                      <a:pPr marL="0" marR="0" indent="0" algn="l" defTabSz="914400" rtl="0" eaLnBrk="1" fontAlgn="auto" latinLnBrk="0" hangingPunct="1">
+                        <a:lnSpc>
+                          <a:spcPct val="100000"/>
+                        </a:lnSpc>
+                        <a:spcBef>
+                          <a:spcPts val="0"/>
+                        </a:spcBef>
+                        <a:spcAft>
+                          <a:spcPts val="0"/>
+                        </a:spcAft>
+                        <a:buClrTx/>
+                        <a:buSzTx/>
+                        <a:buFontTx/>
+                        <a:buNone/>
+                        <a:tabLst/>
+                        <a:defRPr/>
+                      </a:pPr>
+                      <a:r>
+                        <a:rPr lang="en-US" i="1" dirty="0" smtClean="0"/>
+                        <a:t>Did he know just how deeply his father was opposed to things?</a:t>
+                      </a:r>
+                      <a:endParaRPr lang="en-US" dirty="0" smtClean="0"/>
                     </a:p>
                   </a:txBody>
                   <a:tcPr/>
@@ -10688,6 +11345,53 @@
                     <a:bodyPr/>
                     <a:lstStyle/>
                     <a:p>
+                      <a:pPr marL="0" marR="0" indent="0" algn="l" defTabSz="914400" rtl="0" eaLnBrk="1" fontAlgn="auto" latinLnBrk="0" hangingPunct="1">
+                        <a:lnSpc>
+                          <a:spcPct val="100000"/>
+                        </a:lnSpc>
+                        <a:spcBef>
+                          <a:spcPts val="0"/>
+                        </a:spcBef>
+                        <a:spcAft>
+                          <a:spcPts val="0"/>
+                        </a:spcAft>
+                        <a:buClrTx/>
+                        <a:buSzTx/>
+                        <a:buFontTx/>
+                        <a:buNone/>
+                        <a:tabLst/>
+                        <a:defRPr/>
+                      </a:pPr>
+                      <a:r>
+                        <a:rPr lang="en-US" i="1" dirty="0" smtClean="0"/>
+                        <a:t>Why are you doing this?’</a:t>
+                      </a:r>
+                    </a:p>
+                    <a:p>
+                      <a:pPr marL="0" marR="0" indent="0" algn="l" defTabSz="914400" rtl="0" eaLnBrk="1" fontAlgn="auto" latinLnBrk="0" hangingPunct="1">
+                        <a:lnSpc>
+                          <a:spcPct val="100000"/>
+                        </a:lnSpc>
+                        <a:spcBef>
+                          <a:spcPts val="0"/>
+                        </a:spcBef>
+                        <a:spcAft>
+                          <a:spcPts val="0"/>
+                        </a:spcAft>
+                        <a:buClrTx/>
+                        <a:buSzTx/>
+                        <a:buFontTx/>
+                        <a:buNone/>
+                        <a:tabLst/>
+                        <a:defRPr/>
+                      </a:pPr>
+                      <a:r>
+                        <a:rPr lang="en-US" i="1" dirty="0" smtClean="0"/>
+                        <a:t>Who has the papers?</a:t>
+                      </a:r>
+                      <a:endParaRPr lang="en-US" dirty="0" smtClean="0"/>
+                    </a:p>
+                    <a:p>
                       <a:endParaRPr lang="en-US" dirty="0"/>
                     </a:p>
                   </a:txBody>
@@ -10750,6 +11454,10 @@
                     <a:bodyPr/>
                     <a:lstStyle/>
                     <a:p>
+                      <a:r>
+                        <a:rPr lang="en-US" i="1" dirty="0" smtClean="0"/>
+                        <a:t>Do you want a strong cup or a weak one?</a:t>
+                      </a:r>
                       <a:endParaRPr lang="en-US" dirty="0"/>
                     </a:p>
                   </a:txBody>
@@ -10844,113 +11552,17 @@
           </a:bodyPr>
           <a:lstStyle/>
           <a:p>
-            <a:r>
-              <a:rPr lang="en-US" dirty="0" err="1" smtClean="0"/>
-              <a:t>Bảng</a:t>
-            </a:r>
-            <a:r>
-              <a:rPr lang="en-US" dirty="0" smtClean="0"/>
-              <a:t> 1- </a:t>
-            </a:r>
-            <a:r>
-              <a:rPr lang="en-US" dirty="0" err="1" smtClean="0"/>
-              <a:t>các</a:t>
-            </a:r>
-            <a:r>
-              <a:rPr lang="en-US" dirty="0" smtClean="0"/>
-              <a:t> </a:t>
-            </a:r>
-            <a:r>
-              <a:rPr lang="en-US" dirty="0" err="1" smtClean="0"/>
-              <a:t>loại</a:t>
-            </a:r>
-            <a:r>
-              <a:rPr lang="en-US" dirty="0" smtClean="0"/>
-              <a:t> </a:t>
-            </a:r>
-            <a:r>
-              <a:rPr lang="en-US" dirty="0" err="1" smtClean="0"/>
-              <a:t>câu</a:t>
-            </a:r>
-            <a:r>
-              <a:rPr lang="en-US" dirty="0" smtClean="0"/>
-              <a:t> </a:t>
-            </a:r>
-            <a:r>
-              <a:rPr lang="en-US" dirty="0" err="1" smtClean="0"/>
-              <a:t>hỏi</a:t>
-            </a:r>
-            <a:r>
-              <a:rPr lang="en-US" dirty="0" smtClean="0"/>
-              <a:t> </a:t>
-            </a:r>
-            <a:r>
-              <a:rPr lang="en-US" dirty="0" err="1" smtClean="0"/>
-              <a:t>theo</a:t>
-            </a:r>
-            <a:r>
-              <a:rPr lang="en-US" dirty="0" smtClean="0"/>
-              <a:t> </a:t>
-            </a:r>
-            <a:r>
-              <a:rPr lang="en-US" dirty="0" err="1" smtClean="0"/>
-              <a:t>cú</a:t>
-            </a:r>
-            <a:r>
-              <a:rPr lang="en-US" dirty="0" smtClean="0"/>
-              <a:t> </a:t>
-            </a:r>
-            <a:r>
-              <a:rPr lang="en-US" dirty="0" err="1" smtClean="0"/>
-              <a:t>pháp</a:t>
-            </a:r>
-            <a:r>
-              <a:rPr lang="en-US" dirty="0" smtClean="0"/>
-              <a:t> </a:t>
-            </a:r>
-            <a:r>
-              <a:rPr lang="en-US" dirty="0" err="1" smtClean="0"/>
-              <a:t>mà</a:t>
-            </a:r>
-            <a:r>
-              <a:rPr lang="en-US" dirty="0" smtClean="0"/>
-              <a:t> </a:t>
-            </a:r>
-            <a:r>
-              <a:rPr lang="en-US" dirty="0" err="1" smtClean="0"/>
-              <a:t>hệ</a:t>
-            </a:r>
-            <a:r>
-              <a:rPr lang="en-US" dirty="0" smtClean="0"/>
-              <a:t> </a:t>
-            </a:r>
-            <a:r>
-              <a:rPr lang="en-US" dirty="0" err="1" smtClean="0"/>
-              <a:t>thống</a:t>
-            </a:r>
-            <a:r>
-              <a:rPr lang="en-US" dirty="0" smtClean="0"/>
-              <a:t> </a:t>
-            </a:r>
-            <a:r>
-              <a:rPr lang="en-US" dirty="0" err="1" smtClean="0"/>
-              <a:t>xử</a:t>
-            </a:r>
-            <a:r>
-              <a:rPr lang="en-US" dirty="0" smtClean="0"/>
-              <a:t> </a:t>
-            </a:r>
-            <a:r>
-              <a:rPr lang="en-US" dirty="0" err="1" smtClean="0"/>
-              <a:t>lý</a:t>
-            </a:r>
-            <a:r>
-              <a:rPr lang="en-US" dirty="0" smtClean="0"/>
-              <a:t> </a:t>
-            </a:r>
-            <a:r>
-              <a:rPr lang="en-US" dirty="0" err="1" smtClean="0"/>
-              <a:t>được</a:t>
+            <a:pPr algn="ctr"/>
+            <a:r>
+              <a:rPr lang="en-US" dirty="0" smtClean="0"/>
+              <a:t>Bảng 1- các loại câu hỏi theo cú pháp </a:t>
+            </a:r>
+          </a:p>
+          <a:p>
+            <a:pPr algn="ctr"/>
+            <a:r>
+              <a:rPr lang="en-US" dirty="0" smtClean="0"/>
+              <a:t>mà hệ thống xử lý được</a:t>
             </a:r>
             <a:endParaRPr lang="en-US" dirty="0"/>
           </a:p>
@@ -11055,8 +11667,8 @@
           </p:nvPr>
         </p:nvGraphicFramePr>
         <p:xfrm>
-          <a:off x="304800" y="1219200"/>
-          <a:ext cx="8686803" cy="2865120"/>
+          <a:off x="228600" y="838200"/>
+          <a:ext cx="8686803" cy="5303520"/>
         </p:xfrm>
         <a:graphic>
           <a:graphicData uri="http://schemas.openxmlformats.org/drawingml/2006/table">
@@ -11065,11 +11677,11 @@
                 <a:tableStyleId>{C4B1156A-380E-4F78-BDF5-A606A8083BF9}</a:tableStyleId>
               </a:tblPr>
               <a:tblGrid>
-                <a:gridCol w="1524000"/>
-                <a:gridCol w="838200"/>
                 <a:gridCol w="990600"/>
-                <a:gridCol w="3200400"/>
-                <a:gridCol w="2133603"/>
+                <a:gridCol w="990600"/>
+                <a:gridCol w="1143000"/>
+                <a:gridCol w="2971800"/>
+                <a:gridCol w="2590803"/>
               </a:tblGrid>
               <a:tr h="370840">
                 <a:tc>
@@ -11264,6 +11876,10 @@
                     <a:bodyPr/>
                     <a:lstStyle/>
                     <a:p>
+                      <a:r>
+                        <a:rPr lang="en-US" dirty="0" smtClean="0"/>
+                        <a:t>What does the abbreviation AIDS stand for ?</a:t>
+                      </a:r>
                       <a:endParaRPr lang="en-US" dirty="0"/>
                     </a:p>
                   </a:txBody>
@@ -11274,6 +11890,17 @@
                     <a:bodyPr/>
                     <a:lstStyle/>
                     <a:p>
+                      <a:r>
+                        <a:rPr lang="en-US" sz="1800" kern="1200" dirty="0" smtClean="0">
+                          <a:solidFill>
+                            <a:schemeClr val="dk1"/>
+                          </a:solidFill>
+                          <a:latin typeface="+mn-lt"/>
+                          <a:ea typeface="+mn-ea"/>
+                          <a:cs typeface="+mn-cs"/>
+                        </a:rPr>
+                        <a:t>các câu hỏi về các từ viết tắt, từ mở rộng</a:t>
+                      </a:r>
                       <a:endParaRPr lang="en-US" dirty="0"/>
                     </a:p>
                   </a:txBody>
@@ -11348,6 +11975,16 @@
                     <a:bodyPr/>
                     <a:lstStyle/>
                     <a:p>
+                      <a:r>
+                        <a:rPr lang="en-US" dirty="0" smtClean="0"/>
+                        <a:t>What is ethology ?</a:t>
+                      </a:r>
+                    </a:p>
+                    <a:p>
+                      <a:r>
+                        <a:rPr lang="en-US" dirty="0" smtClean="0"/>
+                        <a:t>What is titanium ?</a:t>
+                      </a:r>
                       <a:endParaRPr lang="en-US" dirty="0"/>
                     </a:p>
                   </a:txBody>
@@ -11358,6 +11995,17 @@
                     <a:bodyPr/>
                     <a:lstStyle/>
                     <a:p>
+                      <a:r>
+                        <a:rPr lang="en-US" sz="1800" kern="1200" dirty="0" smtClean="0">
+                          <a:solidFill>
+                            <a:schemeClr val="dk1"/>
+                          </a:solidFill>
+                          <a:latin typeface="+mn-lt"/>
+                          <a:ea typeface="+mn-ea"/>
+                          <a:cs typeface="+mn-cs"/>
+                        </a:rPr>
+                        <a:t>các câu hỏi về miêu tả và định nghĩa</a:t>
+                      </a:r>
                       <a:endParaRPr lang="en-US" dirty="0"/>
                     </a:p>
                   </a:txBody>
@@ -11432,6 +12080,16 @@
                     <a:bodyPr/>
                     <a:lstStyle/>
                     <a:p>
+                      <a:r>
+                        <a:rPr lang="en-US" dirty="0" smtClean="0"/>
+                        <a:t>What kind of animals were in the Paleozoic era ?</a:t>
+                      </a:r>
+                    </a:p>
+                    <a:p>
+                      <a:r>
+                        <a:rPr lang="en-US" dirty="0" smtClean="0"/>
+                        <a:t>What is a female rabbit called ?</a:t>
+                      </a:r>
                       <a:endParaRPr lang="en-US" dirty="0"/>
                     </a:p>
                   </a:txBody>
@@ -11442,6 +12100,17 @@
                     <a:bodyPr/>
                     <a:lstStyle/>
                     <a:p>
+                      <a:r>
+                        <a:rPr lang="en-US" sz="1800" kern="1200" dirty="0" smtClean="0">
+                          <a:solidFill>
+                            <a:schemeClr val="dk1"/>
+                          </a:solidFill>
+                          <a:latin typeface="+mn-lt"/>
+                          <a:ea typeface="+mn-ea"/>
+                          <a:cs typeface="+mn-cs"/>
+                        </a:rPr>
+                        <a:t>các câu hỏi liên quan đến các thực thể, con người, vật </a:t>
+                      </a:r>
                       <a:endParaRPr lang="en-US" dirty="0"/>
                     </a:p>
                   </a:txBody>
@@ -11509,6 +12178,10 @@
                     <a:bodyPr/>
                     <a:lstStyle/>
                     <a:p>
+                      <a:r>
+                        <a:rPr lang="en-US" dirty="0" smtClean="0"/>
+                        <a:t>What actor first portrayed James Bond ?</a:t>
+                      </a:r>
                       <a:endParaRPr lang="en-US" dirty="0"/>
                     </a:p>
                   </a:txBody>
@@ -11519,7 +12192,34 @@
                     <a:bodyPr/>
                     <a:lstStyle/>
                     <a:p>
-                      <a:endParaRPr lang="en-US" dirty="0"/>
+                      <a:pPr marL="0" marR="0" lvl="0" indent="0" algn="l" defTabSz="914400" rtl="0" eaLnBrk="1" fontAlgn="auto" latinLnBrk="0" hangingPunct="1">
+                        <a:lnSpc>
+                          <a:spcPct val="100000"/>
+                        </a:lnSpc>
+                        <a:spcBef>
+                          <a:spcPts val="0"/>
+                        </a:spcBef>
+                        <a:spcAft>
+                          <a:spcPts val="0"/>
+                        </a:spcAft>
+                        <a:buClrTx/>
+                        <a:buSzTx/>
+                        <a:buFontTx/>
+                        <a:buNone/>
+                        <a:tabLst/>
+                        <a:defRPr/>
+                      </a:pPr>
+                      <a:r>
+                        <a:rPr lang="en-US" sz="1800" kern="1200" dirty="0" smtClean="0">
+                          <a:solidFill>
+                            <a:schemeClr val="dk1"/>
+                          </a:solidFill>
+                          <a:latin typeface="+mn-lt"/>
+                          <a:ea typeface="+mn-ea"/>
+                          <a:cs typeface="+mn-cs"/>
+                        </a:rPr>
+                        <a:t>các câu hỏi liên quan tới người và tổ chức</a:t>
+                      </a:r>
                     </a:p>
                   </a:txBody>
                   <a:tcPr/>
@@ -11586,6 +12286,10 @@
                     <a:bodyPr/>
                     <a:lstStyle/>
                     <a:p>
+                      <a:r>
+                        <a:rPr lang="en-US" dirty="0" smtClean="0"/>
+                        <a:t>Which city in Canada is the least-populated ?</a:t>
+                      </a:r>
                       <a:endParaRPr lang="en-US" dirty="0"/>
                     </a:p>
                   </a:txBody>
@@ -11596,6 +12300,17 @@
                     <a:bodyPr/>
                     <a:lstStyle/>
                     <a:p>
+                      <a:r>
+                        <a:rPr lang="en-US" sz="1800" kern="1200" dirty="0" smtClean="0">
+                          <a:solidFill>
+                            <a:schemeClr val="dk1"/>
+                          </a:solidFill>
+                          <a:latin typeface="+mn-lt"/>
+                          <a:ea typeface="+mn-ea"/>
+                          <a:cs typeface="+mn-cs"/>
+                        </a:rPr>
+                        <a:t>các câu hỏi liên quan tới địa điểm</a:t>
+                      </a:r>
                       <a:endParaRPr lang="en-US" dirty="0"/>
                     </a:p>
                   </a:txBody>
@@ -11663,6 +12378,10 @@
                     <a:bodyPr/>
                     <a:lstStyle/>
                     <a:p>
+                      <a:r>
+                        <a:rPr lang="en-US" dirty="0" smtClean="0"/>
+                        <a:t>How many member states are in the UN ?</a:t>
+                      </a:r>
                       <a:endParaRPr lang="en-US" dirty="0"/>
                     </a:p>
                   </a:txBody>
@@ -11673,6 +12392,17 @@
                     <a:bodyPr/>
                     <a:lstStyle/>
                     <a:p>
+                      <a:r>
+                        <a:rPr lang="en-US" sz="1800" kern="1200" dirty="0" smtClean="0">
+                          <a:solidFill>
+                            <a:schemeClr val="dk1"/>
+                          </a:solidFill>
+                          <a:latin typeface="+mn-lt"/>
+                          <a:ea typeface="+mn-ea"/>
+                          <a:cs typeface="+mn-cs"/>
+                        </a:rPr>
+                        <a:t>các câu hỏi liên quan tới số lượng, ngày tháng, mã, tiền...</a:t>
+                      </a:r>
                       <a:endParaRPr lang="en-US" dirty="0"/>
                     </a:p>
                   </a:txBody>
@@ -11691,7 +12421,7 @@
         </p:nvSpPr>
         <p:spPr>
           <a:xfrm>
-            <a:off x="1600200" y="4648200"/>
+            <a:off x="1219200" y="6211669"/>
             <a:ext cx="6019800" cy="646331"/>
           </a:xfrm>
           <a:prstGeom prst="rect">
@@ -11705,165 +12435,10 @@
           </a:bodyPr>
           <a:lstStyle/>
           <a:p>
-            <a:r>
-              <a:rPr lang="en-US" dirty="0" err="1" smtClean="0"/>
-              <a:t>Bảng</a:t>
-            </a:r>
-            <a:r>
-              <a:rPr lang="en-US" dirty="0" smtClean="0"/>
-              <a:t> 2- </a:t>
-            </a:r>
-            <a:r>
-              <a:rPr lang="en-US" dirty="0" err="1" smtClean="0"/>
-              <a:t>các</a:t>
-            </a:r>
-            <a:r>
-              <a:rPr lang="en-US" dirty="0" smtClean="0"/>
-              <a:t> </a:t>
-            </a:r>
-            <a:r>
-              <a:rPr lang="en-US" dirty="0" err="1" smtClean="0"/>
-              <a:t>loại</a:t>
-            </a:r>
-            <a:r>
-              <a:rPr lang="en-US" dirty="0" smtClean="0"/>
-              <a:t> </a:t>
-            </a:r>
-            <a:r>
-              <a:rPr lang="en-US" dirty="0" err="1" smtClean="0"/>
-              <a:t>câu</a:t>
-            </a:r>
-            <a:r>
-              <a:rPr lang="en-US" dirty="0" smtClean="0"/>
-              <a:t> </a:t>
-            </a:r>
-            <a:r>
-              <a:rPr lang="en-US" dirty="0" err="1" smtClean="0"/>
-              <a:t>hỏi</a:t>
-            </a:r>
-            <a:r>
-              <a:rPr lang="en-US" dirty="0" smtClean="0"/>
-              <a:t> </a:t>
-            </a:r>
-            <a:r>
-              <a:rPr lang="en-US" dirty="0" err="1" smtClean="0"/>
-              <a:t>theo</a:t>
-            </a:r>
-            <a:r>
-              <a:rPr lang="en-US" dirty="0" smtClean="0"/>
-              <a:t> </a:t>
-            </a:r>
-            <a:r>
-              <a:rPr lang="en-US" dirty="0" err="1" smtClean="0"/>
-              <a:t>ngữ</a:t>
-            </a:r>
-            <a:r>
-              <a:rPr lang="en-US" dirty="0" smtClean="0"/>
-              <a:t> </a:t>
-            </a:r>
-            <a:r>
-              <a:rPr lang="en-US" dirty="0" err="1" smtClean="0"/>
-              <a:t>nghĩa</a:t>
-            </a:r>
-            <a:r>
-              <a:rPr lang="en-US" dirty="0" smtClean="0"/>
-              <a:t> </a:t>
-            </a:r>
-            <a:r>
-              <a:rPr lang="en-US" dirty="0" err="1" smtClean="0"/>
-              <a:t>mà</a:t>
-            </a:r>
-            <a:r>
-              <a:rPr lang="en-US" dirty="0" smtClean="0"/>
-              <a:t> </a:t>
-            </a:r>
-            <a:r>
-              <a:rPr lang="en-US" dirty="0" err="1" smtClean="0"/>
-              <a:t>hệ</a:t>
-            </a:r>
-            <a:r>
-              <a:rPr lang="en-US" dirty="0" smtClean="0"/>
-              <a:t> </a:t>
-            </a:r>
-            <a:r>
-              <a:rPr lang="en-US" dirty="0" err="1" smtClean="0"/>
-              <a:t>thống</a:t>
-            </a:r>
-            <a:r>
-              <a:rPr lang="en-US" dirty="0" smtClean="0"/>
-              <a:t> </a:t>
-            </a:r>
-            <a:r>
-              <a:rPr lang="en-US" dirty="0" err="1" smtClean="0"/>
-              <a:t>xử</a:t>
-            </a:r>
-            <a:r>
-              <a:rPr lang="en-US" dirty="0" smtClean="0"/>
-              <a:t> </a:t>
-            </a:r>
-            <a:r>
-              <a:rPr lang="en-US" dirty="0" err="1" smtClean="0"/>
-              <a:t>lý</a:t>
-            </a:r>
-            <a:r>
-              <a:rPr lang="en-US" dirty="0" smtClean="0"/>
-              <a:t> </a:t>
-            </a:r>
-            <a:r>
-              <a:rPr lang="en-US" dirty="0" err="1" smtClean="0"/>
-              <a:t>được</a:t>
-            </a:r>
-            <a:r>
-              <a:rPr lang="en-US" dirty="0" smtClean="0"/>
-              <a:t> (</a:t>
-            </a:r>
-            <a:r>
-              <a:rPr lang="en-US" dirty="0" err="1" smtClean="0"/>
-              <a:t>phân</a:t>
-            </a:r>
-            <a:r>
-              <a:rPr lang="en-US" dirty="0" smtClean="0"/>
-              <a:t> </a:t>
-            </a:r>
-            <a:r>
-              <a:rPr lang="en-US" dirty="0" err="1" smtClean="0"/>
-              <a:t>theo</a:t>
-            </a:r>
-            <a:r>
-              <a:rPr lang="en-US" dirty="0" smtClean="0"/>
-              <a:t> 6 </a:t>
-            </a:r>
-            <a:r>
-              <a:rPr lang="en-US" dirty="0" err="1" smtClean="0"/>
-              <a:t>mục</a:t>
-            </a:r>
-            <a:r>
-              <a:rPr lang="en-US" dirty="0" smtClean="0"/>
-              <a:t> </a:t>
-            </a:r>
-            <a:r>
-              <a:rPr lang="en-US" dirty="0" err="1" smtClean="0"/>
-              <a:t>thô</a:t>
-            </a:r>
-            <a:r>
-              <a:rPr lang="en-US" dirty="0" smtClean="0"/>
-              <a:t> </a:t>
-            </a:r>
-            <a:r>
-              <a:rPr lang="en-US" dirty="0" err="1" smtClean="0"/>
-              <a:t>của</a:t>
-            </a:r>
-            <a:r>
-              <a:rPr lang="en-US" dirty="0" smtClean="0"/>
-              <a:t> Li </a:t>
-            </a:r>
-            <a:r>
-              <a:rPr lang="en-US" dirty="0" err="1" smtClean="0"/>
-              <a:t>và</a:t>
-            </a:r>
-            <a:r>
-              <a:rPr lang="en-US" dirty="0" smtClean="0"/>
-              <a:t> Roth)</a:t>
+            <a:pPr algn="ctr"/>
+            <a:r>
+              <a:rPr lang="en-US" dirty="0" smtClean="0"/>
+              <a:t>Bảng 2- các loại câu hỏi theo ngữ nghĩa mà hệ thống xử lý được (phân theo 6 mục thô của Li và Roth)</a:t>
             </a:r>
             <a:endParaRPr lang="en-US" dirty="0"/>
           </a:p>
@@ -11911,39 +12486,47 @@
           <a:p>
             <a:r>
               <a:rPr lang="en-US" dirty="0" err="1" smtClean="0"/>
-              <a:t>Các</a:t>
-            </a:r>
-            <a:r>
-              <a:rPr lang="en-US" dirty="0" smtClean="0"/>
-              <a:t> </a:t>
-            </a:r>
-            <a:r>
-              <a:rPr lang="en-US" dirty="0" err="1" smtClean="0"/>
-              <a:t>nghiên</a:t>
-            </a:r>
-            <a:r>
-              <a:rPr lang="en-US" dirty="0" smtClean="0"/>
-              <a:t> </a:t>
-            </a:r>
-            <a:r>
-              <a:rPr lang="en-US" dirty="0" err="1" smtClean="0"/>
-              <a:t>cứu</a:t>
-            </a:r>
-            <a:r>
-              <a:rPr lang="en-US" dirty="0" smtClean="0"/>
-              <a:t> </a:t>
-            </a:r>
-            <a:r>
-              <a:rPr lang="en-US" dirty="0" err="1" smtClean="0"/>
-              <a:t>liên</a:t>
-            </a:r>
-            <a:r>
-              <a:rPr lang="en-US" dirty="0" smtClean="0"/>
-              <a:t> </a:t>
-            </a:r>
-            <a:r>
-              <a:rPr lang="en-US" dirty="0" err="1" smtClean="0"/>
-              <a:t>quan</a:t>
+              <a:t>Mục</a:t>
+            </a:r>
+            <a:r>
+              <a:rPr lang="en-US" dirty="0" smtClean="0"/>
+              <a:t> </a:t>
+            </a:r>
+            <a:r>
+              <a:rPr lang="en-US" dirty="0" err="1" smtClean="0"/>
+              <a:t>tiêu</a:t>
+            </a:r>
+            <a:r>
+              <a:rPr lang="en-US" dirty="0" smtClean="0"/>
+              <a:t> </a:t>
+            </a:r>
+            <a:r>
+              <a:rPr lang="en-US" dirty="0" err="1" smtClean="0"/>
+              <a:t>và</a:t>
+            </a:r>
+            <a:r>
+              <a:rPr lang="en-US" dirty="0" smtClean="0"/>
+              <a:t> </a:t>
+            </a:r>
+            <a:r>
+              <a:rPr lang="en-US" dirty="0" err="1" smtClean="0"/>
+              <a:t>phạm</a:t>
+            </a:r>
+            <a:r>
+              <a:rPr lang="en-US" dirty="0" smtClean="0"/>
+              <a:t> vi </a:t>
+            </a:r>
+            <a:r>
+              <a:rPr lang="en-US" dirty="0" err="1" smtClean="0"/>
+              <a:t>đề</a:t>
+            </a:r>
+            <a:r>
+              <a:rPr lang="en-US" dirty="0" smtClean="0"/>
+              <a:t> </a:t>
+            </a:r>
+            <a:r>
+              <a:rPr lang="en-US" dirty="0" err="1" smtClean="0"/>
+              <a:t>tài</a:t>
             </a:r>
             <a:endParaRPr lang="en-US" dirty="0"/>
           </a:p>
@@ -11951,7 +12534,7 @@
       </p:sp>
       <p:sp>
         <p:nvSpPr>
-          <p:cNvPr id="3" name="Content Placeholder 2"/>
+          <p:cNvPr id="6" name="Content Placeholder 5"/>
           <p:cNvSpPr>
             <a:spLocks noGrp="1"/>
           </p:cNvSpPr>
@@ -11965,180 +12548,34 @@
           <a:lstStyle/>
           <a:p>
             <a:r>
-              <a:rPr lang="en-US" dirty="0" err="1" smtClean="0"/>
-              <a:t>Nghiên</a:t>
-            </a:r>
-            <a:r>
-              <a:rPr lang="en-US" dirty="0" smtClean="0"/>
-              <a:t> </a:t>
-            </a:r>
-            <a:r>
-              <a:rPr lang="en-US" dirty="0" err="1" smtClean="0"/>
-              <a:t>cứu</a:t>
-            </a:r>
-            <a:r>
-              <a:rPr lang="en-US" dirty="0" smtClean="0"/>
-              <a:t> </a:t>
-            </a:r>
-            <a:r>
-              <a:rPr lang="en-US" dirty="0" err="1" smtClean="0"/>
-              <a:t>của</a:t>
-            </a:r>
-            <a:r>
-              <a:rPr lang="en-US" dirty="0" smtClean="0"/>
-              <a:t> </a:t>
-            </a:r>
-            <a:r>
-              <a:rPr lang="en-US" dirty="0" err="1" smtClean="0"/>
-              <a:t>Wael</a:t>
-            </a:r>
-            <a:r>
-              <a:rPr lang="en-US" dirty="0" smtClean="0"/>
-              <a:t> </a:t>
-            </a:r>
-            <a:r>
-              <a:rPr lang="en-US" dirty="0" err="1" smtClean="0"/>
-              <a:t>Salloum</a:t>
-            </a:r>
-            <a:r>
-              <a:rPr lang="en-US" dirty="0" smtClean="0"/>
-              <a:t> [6] </a:t>
-            </a:r>
-            <a:r>
-              <a:rPr lang="en-US" dirty="0" err="1" smtClean="0"/>
-              <a:t>và</a:t>
-            </a:r>
-            <a:r>
-              <a:rPr lang="en-US" dirty="0" smtClean="0"/>
-              <a:t> </a:t>
-            </a:r>
-            <a:r>
-              <a:rPr lang="en-US" dirty="0" err="1" smtClean="0"/>
-              <a:t>nghiên</a:t>
-            </a:r>
-            <a:r>
-              <a:rPr lang="en-US" dirty="0" smtClean="0"/>
-              <a:t> </a:t>
-            </a:r>
-            <a:r>
-              <a:rPr lang="en-US" dirty="0" err="1" smtClean="0"/>
-              <a:t>cứu</a:t>
-            </a:r>
-            <a:r>
-              <a:rPr lang="en-US" dirty="0" smtClean="0"/>
-              <a:t> </a:t>
-            </a:r>
-            <a:r>
-              <a:rPr lang="en-US" dirty="0" err="1" smtClean="0"/>
-              <a:t>của</a:t>
-            </a:r>
-            <a:r>
-              <a:rPr lang="en-US" dirty="0" smtClean="0"/>
-              <a:t> Cao </a:t>
-            </a:r>
-            <a:r>
-              <a:rPr lang="en-US" dirty="0" err="1" smtClean="0"/>
-              <a:t>Duy</a:t>
-            </a:r>
-            <a:r>
-              <a:rPr lang="en-US" dirty="0" smtClean="0"/>
-              <a:t> </a:t>
-            </a:r>
-            <a:r>
-              <a:rPr lang="en-US" dirty="0" err="1" smtClean="0"/>
-              <a:t>Trường</a:t>
-            </a:r>
-            <a:r>
-              <a:rPr lang="en-US" dirty="0" smtClean="0"/>
-              <a:t> [7] </a:t>
-            </a:r>
-            <a:r>
-              <a:rPr lang="en-US" dirty="0" err="1" smtClean="0"/>
-              <a:t>về</a:t>
-            </a:r>
-            <a:r>
-              <a:rPr lang="en-US" dirty="0" smtClean="0"/>
-              <a:t> </a:t>
-            </a:r>
-            <a:r>
-              <a:rPr lang="en-US" dirty="0" err="1" smtClean="0"/>
-              <a:t>đồ</a:t>
-            </a:r>
-            <a:r>
-              <a:rPr lang="en-US" dirty="0" smtClean="0"/>
-              <a:t> </a:t>
-            </a:r>
-            <a:r>
-              <a:rPr lang="en-US" dirty="0" err="1" smtClean="0"/>
-              <a:t>thị</a:t>
-            </a:r>
-            <a:r>
-              <a:rPr lang="en-US" dirty="0" smtClean="0"/>
-              <a:t> ý </a:t>
-            </a:r>
-            <a:r>
-              <a:rPr lang="en-US" dirty="0" err="1" smtClean="0"/>
-              <a:t>niệm</a:t>
-            </a:r>
-            <a:r>
-              <a:rPr lang="en-US" dirty="0" smtClean="0"/>
-              <a:t> </a:t>
-            </a:r>
-            <a:r>
-              <a:rPr lang="en-US" dirty="0" err="1" smtClean="0"/>
-              <a:t>phục</a:t>
-            </a:r>
-            <a:r>
-              <a:rPr lang="en-US" dirty="0" smtClean="0"/>
-              <a:t> </a:t>
-            </a:r>
-            <a:r>
-              <a:rPr lang="en-US" dirty="0" err="1" smtClean="0"/>
-              <a:t>vụ</a:t>
-            </a:r>
-            <a:r>
-              <a:rPr lang="en-US" dirty="0" smtClean="0"/>
-              <a:t> </a:t>
-            </a:r>
-            <a:r>
-              <a:rPr lang="en-US" dirty="0" err="1" smtClean="0"/>
-              <a:t>cho</a:t>
-            </a:r>
-            <a:r>
-              <a:rPr lang="en-US" dirty="0" smtClean="0"/>
-              <a:t> </a:t>
-            </a:r>
-            <a:r>
-              <a:rPr lang="en-US" dirty="0" err="1" smtClean="0"/>
-              <a:t>hệ</a:t>
-            </a:r>
-            <a:r>
-              <a:rPr lang="en-US" dirty="0" smtClean="0"/>
-              <a:t> </a:t>
-            </a:r>
-            <a:r>
-              <a:rPr lang="en-US" dirty="0" err="1" smtClean="0"/>
-              <a:t>thống</a:t>
-            </a:r>
-            <a:r>
-              <a:rPr lang="en-US" dirty="0" smtClean="0"/>
-              <a:t> </a:t>
-            </a:r>
-            <a:r>
-              <a:rPr lang="en-US" dirty="0" err="1" smtClean="0"/>
-              <a:t>hỏi</a:t>
-            </a:r>
-            <a:r>
-              <a:rPr lang="en-US" dirty="0" smtClean="0"/>
-              <a:t> </a:t>
-            </a:r>
-            <a:r>
-              <a:rPr lang="en-US" dirty="0" err="1" smtClean="0"/>
-              <a:t>đáp</a:t>
-            </a:r>
-            <a:r>
-              <a:rPr lang="en-US" dirty="0" smtClean="0"/>
-              <a:t>.</a:t>
+              <a:rPr lang="en-US" dirty="0" smtClean="0"/>
+              <a:t>Tập câu hỏi kiểm thử sẽ do nhóm tự tạo ra dựa trên một số tham </a:t>
+            </a:r>
+            <a:r>
+              <a:rPr lang="en-US" smtClean="0"/>
+              <a:t>khảo.</a:t>
+            </a:r>
+            <a:endParaRPr lang="en-US" dirty="0" smtClean="0"/>
+          </a:p>
+          <a:p>
+            <a:pPr lvl="1"/>
+            <a:r>
+              <a:rPr lang="en-US" dirty="0" smtClean="0"/>
+              <a:t>Từ tập dữ liệu hỏi đáp TREC</a:t>
+            </a:r>
+          </a:p>
+          <a:p>
+            <a:pPr lvl="1"/>
+            <a:r>
+              <a:rPr lang="en-US" dirty="0" smtClean="0"/>
+              <a:t>Từ nhu cầu người dùng trong tìm kiếm tài liệu</a:t>
+            </a:r>
+          </a:p>
+          <a:p>
+            <a:pPr lvl="1"/>
+            <a:r>
+              <a:rPr lang="en-US" dirty="0" smtClean="0"/>
+              <a:t>Từ các dữ liệu có trong DBLP.</a:t>
             </a:r>
             <a:endParaRPr lang="en-US" dirty="0"/>
           </a:p>
@@ -12240,150 +12677,24 @@
           <a:lstStyle/>
           <a:p>
             <a:r>
-              <a:rPr lang="en-US" dirty="0" err="1" smtClean="0"/>
-              <a:t>Một</a:t>
-            </a:r>
-            <a:r>
-              <a:rPr lang="en-US" dirty="0" smtClean="0"/>
-              <a:t> </a:t>
-            </a:r>
-            <a:r>
-              <a:rPr lang="en-US" dirty="0" err="1" smtClean="0"/>
-              <a:t>số</a:t>
-            </a:r>
-            <a:r>
-              <a:rPr lang="en-US" dirty="0" smtClean="0"/>
-              <a:t> </a:t>
-            </a:r>
-            <a:r>
-              <a:rPr lang="en-US" dirty="0" err="1" smtClean="0"/>
-              <a:t>nghiên</a:t>
-            </a:r>
-            <a:r>
-              <a:rPr lang="en-US" dirty="0" smtClean="0"/>
-              <a:t> </a:t>
-            </a:r>
-            <a:r>
-              <a:rPr lang="en-US" dirty="0" err="1" smtClean="0"/>
-              <a:t>cứu</a:t>
-            </a:r>
-            <a:r>
-              <a:rPr lang="en-US" dirty="0" smtClean="0"/>
-              <a:t> </a:t>
-            </a:r>
-            <a:r>
-              <a:rPr lang="en-US" dirty="0" err="1" smtClean="0"/>
-              <a:t>về</a:t>
-            </a:r>
-            <a:r>
-              <a:rPr lang="en-US" dirty="0" smtClean="0"/>
-              <a:t> </a:t>
-            </a:r>
-            <a:r>
-              <a:rPr lang="en-US" dirty="0" err="1" smtClean="0"/>
-              <a:t>hỏi</a:t>
-            </a:r>
-            <a:r>
-              <a:rPr lang="en-US" dirty="0" smtClean="0"/>
-              <a:t> </a:t>
-            </a:r>
-            <a:r>
-              <a:rPr lang="en-US" dirty="0" err="1" smtClean="0"/>
-              <a:t>đáp</a:t>
-            </a:r>
-            <a:r>
-              <a:rPr lang="en-US" dirty="0" smtClean="0"/>
-              <a:t> </a:t>
-            </a:r>
-            <a:r>
-              <a:rPr lang="en-US" dirty="0" err="1" smtClean="0"/>
-              <a:t>trên</a:t>
-            </a:r>
-            <a:r>
-              <a:rPr lang="en-US" dirty="0" smtClean="0"/>
-              <a:t> Ontology </a:t>
-            </a:r>
-            <a:r>
-              <a:rPr lang="en-US" dirty="0" err="1" smtClean="0"/>
-              <a:t>của</a:t>
-            </a:r>
-            <a:r>
-              <a:rPr lang="en-US" dirty="0" smtClean="0"/>
-              <a:t> </a:t>
-            </a:r>
-            <a:r>
-              <a:rPr lang="en-US" dirty="0" err="1" smtClean="0"/>
-              <a:t>các</a:t>
-            </a:r>
-            <a:r>
-              <a:rPr lang="en-US" dirty="0" smtClean="0"/>
-              <a:t> </a:t>
-            </a:r>
-            <a:r>
-              <a:rPr lang="en-US" dirty="0" err="1" smtClean="0"/>
-              <a:t>tác</a:t>
-            </a:r>
-            <a:r>
-              <a:rPr lang="en-US" dirty="0" smtClean="0"/>
-              <a:t> </a:t>
-            </a:r>
-            <a:r>
-              <a:rPr lang="en-US" dirty="0" err="1" smtClean="0"/>
-              <a:t>giả</a:t>
-            </a:r>
-            <a:r>
-              <a:rPr lang="en-US" dirty="0" smtClean="0"/>
-              <a:t> </a:t>
-            </a:r>
-            <a:r>
-              <a:rPr lang="en-US" dirty="0" err="1" smtClean="0"/>
-              <a:t>Lương</a:t>
-            </a:r>
-            <a:r>
-              <a:rPr lang="en-US" dirty="0" smtClean="0"/>
-              <a:t> </a:t>
-            </a:r>
-            <a:r>
-              <a:rPr lang="en-US" dirty="0" err="1" smtClean="0"/>
-              <a:t>Quý</a:t>
-            </a:r>
-            <a:r>
-              <a:rPr lang="en-US" dirty="0" smtClean="0"/>
-              <a:t> </a:t>
-            </a:r>
-            <a:r>
-              <a:rPr lang="en-US" dirty="0" err="1" smtClean="0"/>
-              <a:t>Tịnh</a:t>
-            </a:r>
-            <a:r>
-              <a:rPr lang="en-US" dirty="0" smtClean="0"/>
-              <a:t> </a:t>
-            </a:r>
-            <a:r>
-              <a:rPr lang="en-US" dirty="0" err="1" smtClean="0"/>
-              <a:t>Hà</a:t>
-            </a:r>
-            <a:r>
-              <a:rPr lang="en-US" dirty="0" smtClean="0"/>
-              <a:t> [8], </a:t>
-            </a:r>
-            <a:r>
-              <a:rPr lang="en-US" dirty="0" err="1" smtClean="0"/>
-              <a:t>Shiyan</a:t>
-            </a:r>
-            <a:r>
-              <a:rPr lang="en-US" dirty="0" smtClean="0"/>
-              <a:t> </a:t>
-            </a:r>
-            <a:r>
-              <a:rPr lang="en-US" dirty="0" err="1" smtClean="0"/>
-              <a:t>Ou</a:t>
-            </a:r>
-            <a:r>
-              <a:rPr lang="en-US" dirty="0" smtClean="0"/>
-              <a:t> [9].</a:t>
-            </a:r>
-            <a:endParaRPr lang="en-US" dirty="0"/>
+              <a:rPr lang="en-US" dirty="0" smtClean="0"/>
+              <a:t>Nghiên cứu của Wael Salloum [6] và nghiên cứu của Cao Duy Trường [7] về đồ thị ý niệm phục vụ cho hệ thống hỏi đáp.</a:t>
+            </a:r>
+          </a:p>
+          <a:p>
+            <a:r>
+              <a:rPr lang="en-US" dirty="0" smtClean="0"/>
+              <a:t>Một số nghiên cứu về hỏi đáp trên Ontology của các tác giả Lương Quý Tịnh Hà [8], Shiyan Ou [9].</a:t>
+            </a:r>
+          </a:p>
+          <a:p>
+            <a:r>
+              <a:rPr lang="en-US" dirty="0" smtClean="0"/>
+              <a:t>Nghiên cứu dùng ngôn ngữ tự nhiên để tra cứu thư viện điện tử của tác giả Đỗ Thị Thanh Tuyền [9] </a:t>
+            </a:r>
+          </a:p>
+          <a:p>
+            <a:endParaRPr lang="en-US" dirty="0" smtClean="0"/>
           </a:p>
         </p:txBody>
       </p:sp>
@@ -12428,227 +12739,72 @@
           <a:lstStyle/>
           <a:p>
             <a:r>
-              <a:rPr lang="en-US" dirty="0" err="1" smtClean="0"/>
-              <a:t>Các</a:t>
-            </a:r>
-            <a:r>
-              <a:rPr lang="en-US" dirty="0" smtClean="0"/>
-              <a:t> </a:t>
-            </a:r>
-            <a:r>
-              <a:rPr lang="en-US" dirty="0" err="1" smtClean="0"/>
-              <a:t>nghiên</a:t>
-            </a:r>
-            <a:r>
-              <a:rPr lang="en-US" dirty="0" smtClean="0"/>
-              <a:t> </a:t>
-            </a:r>
-            <a:r>
-              <a:rPr lang="en-US" dirty="0" err="1" smtClean="0"/>
-              <a:t>cứu</a:t>
-            </a:r>
-            <a:r>
-              <a:rPr lang="en-US" dirty="0" smtClean="0"/>
-              <a:t> </a:t>
-            </a:r>
-            <a:r>
-              <a:rPr lang="en-US" dirty="0" err="1" smtClean="0"/>
-              <a:t>liên</a:t>
-            </a:r>
-            <a:r>
-              <a:rPr lang="en-US" dirty="0" smtClean="0"/>
-              <a:t> </a:t>
-            </a:r>
-            <a:r>
-              <a:rPr lang="en-US" dirty="0" err="1" smtClean="0"/>
-              <a:t>quan</a:t>
+              <a:rPr lang="en-US" dirty="0" smtClean="0"/>
+              <a:t>Xây dựng hệ thống tra cứu bài báo</a:t>
             </a:r>
             <a:endParaRPr lang="en-US" dirty="0"/>
           </a:p>
         </p:txBody>
       </p:sp>
+      <p:pic>
+        <p:nvPicPr>
+          <p:cNvPr id="4098" name="Picture 2"/>
+          <p:cNvPicPr>
+            <a:picLocks noChangeAspect="1" noChangeArrowheads="1"/>
+          </p:cNvPicPr>
+          <p:nvPr/>
+        </p:nvPicPr>
+        <p:blipFill>
+          <a:blip r:embed="rId2"/>
+          <a:srcRect/>
+          <a:stretch>
+            <a:fillRect/>
+          </a:stretch>
+        </p:blipFill>
+        <p:spPr bwMode="auto">
+          <a:xfrm>
+            <a:off x="1828800" y="914400"/>
+            <a:ext cx="5105400" cy="5181600"/>
+          </a:xfrm>
+          <a:prstGeom prst="rect">
+            <a:avLst/>
+          </a:prstGeom>
+          <a:noFill/>
+          <a:ln w="9525">
+            <a:noFill/>
+            <a:miter lim="800000"/>
+            <a:headEnd/>
+            <a:tailEnd/>
+          </a:ln>
+          <a:effectLst/>
+        </p:spPr>
+      </p:pic>
       <p:sp>
         <p:nvSpPr>
-          <p:cNvPr id="3" name="Content Placeholder 2"/>
-          <p:cNvSpPr>
-            <a:spLocks noGrp="1"/>
-          </p:cNvSpPr>
-          <p:nvPr>
-            <p:ph idx="1"/>
-          </p:nvPr>
+          <p:cNvPr id="5" name="TextBox 4"/>
+          <p:cNvSpPr txBox="1"/>
+          <p:nvPr/>
         </p:nvSpPr>
-        <p:spPr/>
+        <p:spPr>
+          <a:xfrm>
+            <a:off x="1371600" y="6172200"/>
+            <a:ext cx="6096000" cy="381000"/>
+          </a:xfrm>
+          <a:prstGeom prst="rect">
+            <a:avLst/>
+          </a:prstGeom>
+          <a:noFill/>
+        </p:spPr>
         <p:txBody>
-          <a:bodyPr/>
+          <a:bodyPr wrap="square" rtlCol="0">
+            <a:spAutoFit/>
+          </a:bodyPr>
           <a:lstStyle/>
           <a:p>
-            <a:r>
-              <a:rPr lang="en-US" dirty="0" err="1" smtClean="0"/>
-              <a:t>Nghiên</a:t>
-            </a:r>
-            <a:r>
-              <a:rPr lang="en-US" dirty="0" smtClean="0"/>
-              <a:t> </a:t>
-            </a:r>
-            <a:r>
-              <a:rPr lang="en-US" dirty="0" err="1" smtClean="0"/>
-              <a:t>cứu</a:t>
-            </a:r>
-            <a:r>
-              <a:rPr lang="en-US" dirty="0" smtClean="0"/>
-              <a:t> </a:t>
-            </a:r>
-            <a:r>
-              <a:rPr lang="en-US" dirty="0" err="1" smtClean="0"/>
-              <a:t>dùng</a:t>
-            </a:r>
-            <a:r>
-              <a:rPr lang="en-US" dirty="0" smtClean="0"/>
-              <a:t> </a:t>
-            </a:r>
-            <a:r>
-              <a:rPr lang="en-US" dirty="0" err="1" smtClean="0"/>
-              <a:t>ngôn</a:t>
-            </a:r>
-            <a:r>
-              <a:rPr lang="en-US" dirty="0" smtClean="0"/>
-              <a:t> </a:t>
-            </a:r>
-            <a:r>
-              <a:rPr lang="en-US" dirty="0" err="1" smtClean="0"/>
-              <a:t>ngữ</a:t>
-            </a:r>
-            <a:r>
-              <a:rPr lang="en-US" dirty="0" smtClean="0"/>
-              <a:t> </a:t>
-            </a:r>
-            <a:r>
-              <a:rPr lang="en-US" dirty="0" err="1" smtClean="0"/>
-              <a:t>tự</a:t>
-            </a:r>
-            <a:r>
-              <a:rPr lang="en-US" dirty="0" smtClean="0"/>
-              <a:t> </a:t>
-            </a:r>
-            <a:r>
-              <a:rPr lang="en-US" dirty="0" err="1" smtClean="0"/>
-              <a:t>nhiên</a:t>
-            </a:r>
-            <a:r>
-              <a:rPr lang="en-US" dirty="0" smtClean="0"/>
-              <a:t> </a:t>
-            </a:r>
-            <a:r>
-              <a:rPr lang="en-US" dirty="0" err="1" smtClean="0"/>
-              <a:t>để</a:t>
-            </a:r>
-            <a:r>
-              <a:rPr lang="en-US" dirty="0" smtClean="0"/>
-              <a:t> </a:t>
-            </a:r>
-            <a:r>
-              <a:rPr lang="en-US" dirty="0" err="1" smtClean="0"/>
-              <a:t>tra</a:t>
-            </a:r>
-            <a:r>
-              <a:rPr lang="en-US" dirty="0" smtClean="0"/>
-              <a:t> </a:t>
-            </a:r>
-            <a:r>
-              <a:rPr lang="en-US" dirty="0" err="1" smtClean="0"/>
-              <a:t>cứu</a:t>
-            </a:r>
-            <a:r>
-              <a:rPr lang="en-US" dirty="0" smtClean="0"/>
-              <a:t> </a:t>
-            </a:r>
-            <a:r>
-              <a:rPr lang="en-US" dirty="0" err="1" smtClean="0"/>
-              <a:t>thư</a:t>
-            </a:r>
-            <a:r>
-              <a:rPr lang="en-US" dirty="0" smtClean="0"/>
-              <a:t> </a:t>
-            </a:r>
-            <a:r>
-              <a:rPr lang="en-US" dirty="0" err="1" smtClean="0"/>
-              <a:t>viện</a:t>
-            </a:r>
-            <a:r>
-              <a:rPr lang="en-US" dirty="0" smtClean="0"/>
-              <a:t> </a:t>
-            </a:r>
-            <a:r>
-              <a:rPr lang="en-US" dirty="0" err="1" smtClean="0"/>
-              <a:t>điện</a:t>
-            </a:r>
-            <a:r>
-              <a:rPr lang="en-US" dirty="0" smtClean="0"/>
-              <a:t> </a:t>
-            </a:r>
-            <a:r>
-              <a:rPr lang="en-US" dirty="0" err="1" smtClean="0"/>
-              <a:t>tử</a:t>
-            </a:r>
-            <a:r>
-              <a:rPr lang="en-US" dirty="0" smtClean="0"/>
-              <a:t> </a:t>
-            </a:r>
-            <a:r>
-              <a:rPr lang="en-US" dirty="0" err="1" smtClean="0"/>
-              <a:t>của</a:t>
-            </a:r>
-            <a:r>
-              <a:rPr lang="en-US" dirty="0" smtClean="0"/>
-              <a:t> </a:t>
-            </a:r>
-            <a:r>
-              <a:rPr lang="en-US" dirty="0" err="1" smtClean="0"/>
-              <a:t>tác</a:t>
-            </a:r>
-            <a:r>
-              <a:rPr lang="en-US" dirty="0" smtClean="0"/>
-              <a:t> </a:t>
-            </a:r>
-            <a:r>
-              <a:rPr lang="en-US" dirty="0" err="1" smtClean="0"/>
-              <a:t>giả</a:t>
-            </a:r>
-            <a:r>
-              <a:rPr lang="en-US" dirty="0" smtClean="0"/>
-              <a:t> </a:t>
-            </a:r>
-            <a:r>
-              <a:rPr lang="en-US" dirty="0" err="1" smtClean="0"/>
-              <a:t>Đỗ</a:t>
-            </a:r>
-            <a:r>
-              <a:rPr lang="en-US" dirty="0" smtClean="0"/>
-              <a:t> </a:t>
-            </a:r>
-            <a:r>
-              <a:rPr lang="en-US" dirty="0" err="1" smtClean="0"/>
-              <a:t>Thị</a:t>
-            </a:r>
-            <a:r>
-              <a:rPr lang="en-US" dirty="0" smtClean="0"/>
-              <a:t> </a:t>
-            </a:r>
-            <a:r>
-              <a:rPr lang="en-US" dirty="0" err="1" smtClean="0"/>
-              <a:t>Thanh</a:t>
-            </a:r>
-            <a:r>
-              <a:rPr lang="en-US" dirty="0" smtClean="0"/>
-              <a:t> </a:t>
-            </a:r>
-            <a:r>
-              <a:rPr lang="en-US" dirty="0" err="1" smtClean="0"/>
-              <a:t>Tuyền</a:t>
-            </a:r>
-            <a:r>
-              <a:rPr lang="en-US" dirty="0" smtClean="0"/>
-              <a:t> [9] </a:t>
+            <a:pPr algn="ctr"/>
+            <a:r>
+              <a:rPr lang="en-US" dirty="0" smtClean="0"/>
+              <a:t>Hình 3 – cấu trúc hệ thống</a:t>
             </a:r>
             <a:endParaRPr lang="en-US" dirty="0"/>
           </a:p>

</xml_diff>